<commit_message>
Fix presentation, add some stuff
</commit_message>
<xml_diff>
--- a/Презентация.pptx
+++ b/Презентация.pptx
@@ -311,7 +311,7 @@
           <a:p>
             <a:fld id="{6C844F76-6A9F-4673-9E5B-11DA2C86978C}" type="datetimeFigureOut">
               <a:rPr lang="ru-RU" smtClean="0"/>
-              <a:t>08.01.2018</a:t>
+              <a:t>17.01.2018</a:t>
             </a:fld>
             <a:endParaRPr lang="ru-RU"/>
           </a:p>
@@ -481,7 +481,7 @@
           <a:p>
             <a:fld id="{6C844F76-6A9F-4673-9E5B-11DA2C86978C}" type="datetimeFigureOut">
               <a:rPr lang="ru-RU" smtClean="0"/>
-              <a:t>08.01.2018</a:t>
+              <a:t>17.01.2018</a:t>
             </a:fld>
             <a:endParaRPr lang="ru-RU"/>
           </a:p>
@@ -661,7 +661,7 @@
           <a:p>
             <a:fld id="{6C844F76-6A9F-4673-9E5B-11DA2C86978C}" type="datetimeFigureOut">
               <a:rPr lang="ru-RU" smtClean="0"/>
-              <a:t>08.01.2018</a:t>
+              <a:t>17.01.2018</a:t>
             </a:fld>
             <a:endParaRPr lang="ru-RU"/>
           </a:p>
@@ -831,7 +831,7 @@
           <a:p>
             <a:fld id="{6C844F76-6A9F-4673-9E5B-11DA2C86978C}" type="datetimeFigureOut">
               <a:rPr lang="ru-RU" smtClean="0"/>
-              <a:t>08.01.2018</a:t>
+              <a:t>17.01.2018</a:t>
             </a:fld>
             <a:endParaRPr lang="ru-RU"/>
           </a:p>
@@ -1077,7 +1077,7 @@
           <a:p>
             <a:fld id="{6C844F76-6A9F-4673-9E5B-11DA2C86978C}" type="datetimeFigureOut">
               <a:rPr lang="ru-RU" smtClean="0"/>
-              <a:t>08.01.2018</a:t>
+              <a:t>17.01.2018</a:t>
             </a:fld>
             <a:endParaRPr lang="ru-RU"/>
           </a:p>
@@ -1365,7 +1365,7 @@
           <a:p>
             <a:fld id="{6C844F76-6A9F-4673-9E5B-11DA2C86978C}" type="datetimeFigureOut">
               <a:rPr lang="ru-RU" smtClean="0"/>
-              <a:t>08.01.2018</a:t>
+              <a:t>17.01.2018</a:t>
             </a:fld>
             <a:endParaRPr lang="ru-RU"/>
           </a:p>
@@ -1787,7 +1787,7 @@
           <a:p>
             <a:fld id="{6C844F76-6A9F-4673-9E5B-11DA2C86978C}" type="datetimeFigureOut">
               <a:rPr lang="ru-RU" smtClean="0"/>
-              <a:t>08.01.2018</a:t>
+              <a:t>17.01.2018</a:t>
             </a:fld>
             <a:endParaRPr lang="ru-RU"/>
           </a:p>
@@ -1905,7 +1905,7 @@
           <a:p>
             <a:fld id="{6C844F76-6A9F-4673-9E5B-11DA2C86978C}" type="datetimeFigureOut">
               <a:rPr lang="ru-RU" smtClean="0"/>
-              <a:t>08.01.2018</a:t>
+              <a:t>17.01.2018</a:t>
             </a:fld>
             <a:endParaRPr lang="ru-RU"/>
           </a:p>
@@ -2000,7 +2000,7 @@
           <a:p>
             <a:fld id="{6C844F76-6A9F-4673-9E5B-11DA2C86978C}" type="datetimeFigureOut">
               <a:rPr lang="ru-RU" smtClean="0"/>
-              <a:t>08.01.2018</a:t>
+              <a:t>17.01.2018</a:t>
             </a:fld>
             <a:endParaRPr lang="ru-RU"/>
           </a:p>
@@ -2277,7 +2277,7 @@
           <a:p>
             <a:fld id="{6C844F76-6A9F-4673-9E5B-11DA2C86978C}" type="datetimeFigureOut">
               <a:rPr lang="ru-RU" smtClean="0"/>
-              <a:t>08.01.2018</a:t>
+              <a:t>17.01.2018</a:t>
             </a:fld>
             <a:endParaRPr lang="ru-RU"/>
           </a:p>
@@ -2530,7 +2530,7 @@
           <a:p>
             <a:fld id="{6C844F76-6A9F-4673-9E5B-11DA2C86978C}" type="datetimeFigureOut">
               <a:rPr lang="ru-RU" smtClean="0"/>
-              <a:t>08.01.2018</a:t>
+              <a:t>17.01.2018</a:t>
             </a:fld>
             <a:endParaRPr lang="ru-RU"/>
           </a:p>
@@ -2743,7 +2743,7 @@
           <a:p>
             <a:fld id="{6C844F76-6A9F-4673-9E5B-11DA2C86978C}" type="datetimeFigureOut">
               <a:rPr lang="ru-RU" smtClean="0"/>
-              <a:t>08.01.2018</a:t>
+              <a:t>17.01.2018</a:t>
             </a:fld>
             <a:endParaRPr lang="ru-RU"/>
           </a:p>
@@ -3167,15 +3167,43 @@
               <a:defRPr/>
             </a:pPr>
             <a:r>
-              <a:rPr lang="ru-RU" sz="2600" dirty="0"/>
-              <a:t>Соискатель:		</a:t>
-            </a:r>
-            <a:r>
-              <a:rPr lang="ru-RU" sz="2600" dirty="0" smtClean="0"/>
+              <a:rPr lang="ru-RU" sz="2600" dirty="0" smtClean="0">
+                <a:solidFill>
+                  <a:schemeClr val="bg1">
+                    <a:lumMod val="65000"/>
+                  </a:schemeClr>
+                </a:solidFill>
+              </a:rPr>
+              <a:t>Магистрант:</a:t>
+            </a:r>
+            <a:r>
+              <a:rPr lang="ru-RU" sz="2600" dirty="0">
+                <a:solidFill>
+                  <a:schemeClr val="bg1">
+                    <a:lumMod val="65000"/>
+                  </a:schemeClr>
+                </a:solidFill>
+              </a:rPr>
+              <a:t>		</a:t>
+            </a:r>
+            <a:r>
+              <a:rPr lang="ru-RU" sz="2600" dirty="0" smtClean="0">
+                <a:solidFill>
+                  <a:schemeClr val="bg1">
+                    <a:lumMod val="65000"/>
+                  </a:schemeClr>
+                </a:solidFill>
+              </a:rPr>
               <a:t>Белов А.В</a:t>
             </a:r>
             <a:r>
-              <a:rPr lang="ru-RU" sz="2600" dirty="0"/>
+              <a:rPr lang="ru-RU" sz="2600" dirty="0">
+                <a:solidFill>
+                  <a:schemeClr val="bg1">
+                    <a:lumMod val="65000"/>
+                  </a:schemeClr>
+                </a:solidFill>
+              </a:rPr>
               <a:t>.</a:t>
             </a:r>
           </a:p>
@@ -3184,20 +3212,127 @@
               <a:defRPr/>
             </a:pPr>
             <a:r>
-              <a:rPr lang="ru-RU" sz="2600" dirty="0"/>
+              <a:rPr lang="ru-RU" sz="2600" dirty="0">
+                <a:solidFill>
+                  <a:schemeClr val="bg1">
+                    <a:lumMod val="65000"/>
+                  </a:schemeClr>
+                </a:solidFill>
+              </a:rPr>
               <a:t>Руководитель:	</a:t>
             </a:r>
             <a:r>
-              <a:rPr lang="ru-RU" sz="2600" dirty="0" smtClean="0"/>
-              <a:t>Лукашевич М.М</a:t>
-            </a:r>
-            <a:r>
-              <a:rPr lang="ru-RU" sz="2600" dirty="0"/>
+              <a:rPr lang="ru-RU" sz="2600" dirty="0" smtClean="0">
+                <a:solidFill>
+                  <a:schemeClr val="bg1">
+                    <a:lumMod val="65000"/>
+                  </a:schemeClr>
+                </a:solidFill>
+              </a:rPr>
+              <a:t>доцент, к.т.н.</a:t>
+            </a:r>
+          </a:p>
+          <a:p>
+            <a:pPr algn="l">
+              <a:defRPr/>
+            </a:pPr>
+            <a:r>
+              <a:rPr lang="ru-RU" sz="2600" dirty="0">
+                <a:solidFill>
+                  <a:schemeClr val="bg1">
+                    <a:lumMod val="65000"/>
+                  </a:schemeClr>
+                </a:solidFill>
+              </a:rPr>
+              <a:t>	</a:t>
+            </a:r>
+            <a:r>
+              <a:rPr lang="ru-RU" sz="2600" dirty="0" smtClean="0">
+                <a:solidFill>
+                  <a:schemeClr val="bg1">
+                    <a:lumMod val="65000"/>
+                  </a:schemeClr>
+                </a:solidFill>
+              </a:rPr>
+              <a:t>		Лукашевич М.М</a:t>
+            </a:r>
+            <a:r>
+              <a:rPr lang="ru-RU" sz="2600" dirty="0">
+                <a:solidFill>
+                  <a:schemeClr val="bg1">
+                    <a:lumMod val="65000"/>
+                  </a:schemeClr>
+                </a:solidFill>
+              </a:rPr>
               <a:t>.</a:t>
             </a:r>
           </a:p>
           <a:p>
-            <a:endParaRPr lang="ru-RU" sz="2600" dirty="0"/>
+            <a:endParaRPr lang="ru-RU" sz="2600" dirty="0">
+              <a:solidFill>
+                <a:schemeClr val="bg1">
+                  <a:lumMod val="65000"/>
+                </a:schemeClr>
+              </a:solidFill>
+            </a:endParaRPr>
+          </a:p>
+        </p:txBody>
+      </p:sp>
+      <p:sp>
+        <p:nvSpPr>
+          <p:cNvPr id="4" name="Заголовок 1"/>
+          <p:cNvSpPr txBox="1">
+            <a:spLocks/>
+          </p:cNvSpPr>
+          <p:nvPr/>
+        </p:nvSpPr>
+        <p:spPr>
+          <a:xfrm>
+            <a:off x="683568" y="0"/>
+            <a:ext cx="7772400" cy="1470025"/>
+          </a:xfrm>
+          <a:prstGeom prst="rect">
+            <a:avLst/>
+          </a:prstGeom>
+        </p:spPr>
+        <p:txBody>
+          <a:bodyPr vert="horz" lIns="91440" tIns="45720" rIns="91440" bIns="45720" rtlCol="0" anchor="ctr">
+            <a:normAutofit/>
+          </a:bodyPr>
+          <a:lstStyle>
+            <a:lvl1pPr algn="ctr" defTabSz="914400" rtl="0" eaLnBrk="1" latinLnBrk="0" hangingPunct="1">
+              <a:spcBef>
+                <a:spcPct val="0"/>
+              </a:spcBef>
+              <a:buNone/>
+              <a:defRPr sz="4400" kern="1200">
+                <a:solidFill>
+                  <a:schemeClr val="tx1"/>
+                </a:solidFill>
+                <a:latin typeface="+mj-lt"/>
+                <a:ea typeface="+mj-ea"/>
+                <a:cs typeface="+mj-cs"/>
+              </a:defRPr>
+            </a:lvl1pPr>
+          </a:lstStyle>
+          <a:p>
+            <a:r>
+              <a:rPr lang="ru-RU" sz="1600" dirty="0" smtClean="0">
+                <a:solidFill>
+                  <a:schemeClr val="bg1">
+                    <a:lumMod val="65000"/>
+                  </a:schemeClr>
+                </a:solidFill>
+              </a:rPr>
+              <a:t>Специальность 1 – 40 81 02 «Технологии виртуализации и облачных вычислений»</a:t>
+            </a:r>
+            <a:endParaRPr lang="ru-RU" sz="1600" dirty="0">
+              <a:solidFill>
+                <a:schemeClr val="bg1">
+                  <a:lumMod val="65000"/>
+                </a:schemeClr>
+              </a:solidFill>
+            </a:endParaRPr>
           </a:p>
         </p:txBody>
       </p:sp>
@@ -3453,6 +3588,13 @@
   <p:clrMapOvr>
     <a:masterClrMapping/>
   </p:clrMapOvr>
+  <p:timing>
+    <p:tnLst>
+      <p:par>
+        <p:cTn id="1" dur="indefinite" restart="never" nodeType="tmRoot"/>
+      </p:par>
+    </p:tnLst>
+  </p:timing>
 </p:sld>
 </file>
 
@@ -3550,6 +3692,150 @@
           </a:extLst>
         </p:spPr>
       </p:pic>
+      <p:sp>
+        <p:nvSpPr>
+          <p:cNvPr id="3" name="Прямоугольник 2"/>
+          <p:cNvSpPr/>
+          <p:nvPr/>
+        </p:nvSpPr>
+        <p:spPr>
+          <a:xfrm>
+            <a:off x="539552" y="3284984"/>
+            <a:ext cx="1728192" cy="1152128"/>
+          </a:xfrm>
+          <a:prstGeom prst="rect">
+            <a:avLst/>
+          </a:prstGeom>
+          <a:solidFill>
+            <a:srgbClr val="4F81BD">
+              <a:alpha val="30196"/>
+            </a:srgbClr>
+          </a:solidFill>
+          <a:ln>
+            <a:noFill/>
+          </a:ln>
+        </p:spPr>
+        <p:style>
+          <a:lnRef idx="2">
+            <a:schemeClr val="accent1">
+              <a:shade val="50000"/>
+            </a:schemeClr>
+          </a:lnRef>
+          <a:fillRef idx="1">
+            <a:schemeClr val="accent1"/>
+          </a:fillRef>
+          <a:effectRef idx="0">
+            <a:schemeClr val="accent1"/>
+          </a:effectRef>
+          <a:fontRef idx="minor">
+            <a:schemeClr val="lt1"/>
+          </a:fontRef>
+        </p:style>
+        <p:txBody>
+          <a:bodyPr rtlCol="0" anchor="ctr"/>
+          <a:lstStyle/>
+          <a:p>
+            <a:pPr algn="ctr"/>
+            <a:endParaRPr lang="ru-RU"/>
+          </a:p>
+        </p:txBody>
+      </p:sp>
+      <p:sp>
+        <p:nvSpPr>
+          <p:cNvPr id="5" name="Прямоугольник 4"/>
+          <p:cNvSpPr/>
+          <p:nvPr/>
+        </p:nvSpPr>
+        <p:spPr>
+          <a:xfrm>
+            <a:off x="4788024" y="3284984"/>
+            <a:ext cx="1728192" cy="1152128"/>
+          </a:xfrm>
+          <a:prstGeom prst="rect">
+            <a:avLst/>
+          </a:prstGeom>
+          <a:solidFill>
+            <a:srgbClr val="4F81BD">
+              <a:alpha val="30196"/>
+            </a:srgbClr>
+          </a:solidFill>
+          <a:ln>
+            <a:noFill/>
+          </a:ln>
+        </p:spPr>
+        <p:style>
+          <a:lnRef idx="2">
+            <a:schemeClr val="accent1">
+              <a:shade val="50000"/>
+            </a:schemeClr>
+          </a:lnRef>
+          <a:fillRef idx="1">
+            <a:schemeClr val="accent1"/>
+          </a:fillRef>
+          <a:effectRef idx="0">
+            <a:schemeClr val="accent1"/>
+          </a:effectRef>
+          <a:fontRef idx="minor">
+            <a:schemeClr val="lt1"/>
+          </a:fontRef>
+        </p:style>
+        <p:txBody>
+          <a:bodyPr rtlCol="0" anchor="ctr"/>
+          <a:lstStyle/>
+          <a:p>
+            <a:pPr algn="ctr"/>
+            <a:endParaRPr lang="ru-RU"/>
+          </a:p>
+        </p:txBody>
+      </p:sp>
+      <p:sp>
+        <p:nvSpPr>
+          <p:cNvPr id="6" name="Прямоугольник 5"/>
+          <p:cNvSpPr/>
+          <p:nvPr/>
+        </p:nvSpPr>
+        <p:spPr>
+          <a:xfrm>
+            <a:off x="6876256" y="3284984"/>
+            <a:ext cx="1728192" cy="1152128"/>
+          </a:xfrm>
+          <a:prstGeom prst="rect">
+            <a:avLst/>
+          </a:prstGeom>
+          <a:solidFill>
+            <a:srgbClr val="4F81BD">
+              <a:alpha val="30196"/>
+            </a:srgbClr>
+          </a:solidFill>
+          <a:ln>
+            <a:noFill/>
+          </a:ln>
+        </p:spPr>
+        <p:style>
+          <a:lnRef idx="2">
+            <a:schemeClr val="accent1">
+              <a:shade val="50000"/>
+            </a:schemeClr>
+          </a:lnRef>
+          <a:fillRef idx="1">
+            <a:schemeClr val="accent1"/>
+          </a:fillRef>
+          <a:effectRef idx="0">
+            <a:schemeClr val="accent1"/>
+          </a:effectRef>
+          <a:fontRef idx="minor">
+            <a:schemeClr val="lt1"/>
+          </a:fontRef>
+        </p:style>
+        <p:txBody>
+          <a:bodyPr rtlCol="0" anchor="ctr"/>
+          <a:lstStyle/>
+          <a:p>
+            <a:pPr algn="ctr"/>
+            <a:endParaRPr lang="ru-RU"/>
+          </a:p>
+        </p:txBody>
+      </p:sp>
     </p:spTree>
     <p:extLst>
       <p:ext uri="{BB962C8B-B14F-4D97-AF65-F5344CB8AC3E}">
@@ -3634,7 +3920,7 @@
         <p:spPr bwMode="auto">
           <a:xfrm>
             <a:off x="539552" y="1412776"/>
-            <a:ext cx="8208912" cy="5040560"/>
+            <a:ext cx="8136904" cy="5040560"/>
           </a:xfrm>
           <a:prstGeom prst="rect">
             <a:avLst/>
@@ -3664,6 +3950,198 @@
           </a:extLst>
         </p:spPr>
       </p:pic>
+      <p:sp>
+        <p:nvSpPr>
+          <p:cNvPr id="4" name="Прямоугольник 3"/>
+          <p:cNvSpPr/>
+          <p:nvPr/>
+        </p:nvSpPr>
+        <p:spPr>
+          <a:xfrm>
+            <a:off x="3962756" y="2636912"/>
+            <a:ext cx="756084" cy="1008112"/>
+          </a:xfrm>
+          <a:prstGeom prst="rect">
+            <a:avLst/>
+          </a:prstGeom>
+          <a:solidFill>
+            <a:srgbClr val="4F81BD">
+              <a:alpha val="30196"/>
+            </a:srgbClr>
+          </a:solidFill>
+          <a:ln>
+            <a:noFill/>
+          </a:ln>
+        </p:spPr>
+        <p:style>
+          <a:lnRef idx="2">
+            <a:schemeClr val="accent1">
+              <a:shade val="50000"/>
+            </a:schemeClr>
+          </a:lnRef>
+          <a:fillRef idx="1">
+            <a:schemeClr val="accent1"/>
+          </a:fillRef>
+          <a:effectRef idx="0">
+            <a:schemeClr val="accent1"/>
+          </a:effectRef>
+          <a:fontRef idx="minor">
+            <a:schemeClr val="lt1"/>
+          </a:fontRef>
+        </p:style>
+        <p:txBody>
+          <a:bodyPr rtlCol="0" anchor="ctr"/>
+          <a:lstStyle/>
+          <a:p>
+            <a:pPr algn="ctr"/>
+            <a:endParaRPr lang="ru-RU"/>
+          </a:p>
+        </p:txBody>
+      </p:sp>
+      <p:sp>
+        <p:nvSpPr>
+          <p:cNvPr id="5" name="Прямоугольник 4"/>
+          <p:cNvSpPr/>
+          <p:nvPr/>
+        </p:nvSpPr>
+        <p:spPr>
+          <a:xfrm>
+            <a:off x="5234217" y="2636912"/>
+            <a:ext cx="761162" cy="1080120"/>
+          </a:xfrm>
+          <a:prstGeom prst="rect">
+            <a:avLst/>
+          </a:prstGeom>
+          <a:solidFill>
+            <a:srgbClr val="4F81BD">
+              <a:alpha val="30196"/>
+            </a:srgbClr>
+          </a:solidFill>
+          <a:ln>
+            <a:noFill/>
+          </a:ln>
+        </p:spPr>
+        <p:style>
+          <a:lnRef idx="2">
+            <a:schemeClr val="accent1">
+              <a:shade val="50000"/>
+            </a:schemeClr>
+          </a:lnRef>
+          <a:fillRef idx="1">
+            <a:schemeClr val="accent1"/>
+          </a:fillRef>
+          <a:effectRef idx="0">
+            <a:schemeClr val="accent1"/>
+          </a:effectRef>
+          <a:fontRef idx="minor">
+            <a:schemeClr val="lt1"/>
+          </a:fontRef>
+        </p:style>
+        <p:txBody>
+          <a:bodyPr rtlCol="0" anchor="ctr"/>
+          <a:lstStyle/>
+          <a:p>
+            <a:pPr algn="ctr"/>
+            <a:endParaRPr lang="ru-RU"/>
+          </a:p>
+        </p:txBody>
+      </p:sp>
+      <p:sp>
+        <p:nvSpPr>
+          <p:cNvPr id="6" name="Прямоугольник 5"/>
+          <p:cNvSpPr/>
+          <p:nvPr/>
+        </p:nvSpPr>
+        <p:spPr>
+          <a:xfrm>
+            <a:off x="5234217" y="4247554"/>
+            <a:ext cx="993967" cy="837630"/>
+          </a:xfrm>
+          <a:prstGeom prst="rect">
+            <a:avLst/>
+          </a:prstGeom>
+          <a:solidFill>
+            <a:srgbClr val="4F81BD">
+              <a:alpha val="30196"/>
+            </a:srgbClr>
+          </a:solidFill>
+          <a:ln>
+            <a:noFill/>
+          </a:ln>
+        </p:spPr>
+        <p:style>
+          <a:lnRef idx="2">
+            <a:schemeClr val="accent1">
+              <a:shade val="50000"/>
+            </a:schemeClr>
+          </a:lnRef>
+          <a:fillRef idx="1">
+            <a:schemeClr val="accent1"/>
+          </a:fillRef>
+          <a:effectRef idx="0">
+            <a:schemeClr val="accent1"/>
+          </a:effectRef>
+          <a:fontRef idx="minor">
+            <a:schemeClr val="lt1"/>
+          </a:fontRef>
+        </p:style>
+        <p:txBody>
+          <a:bodyPr rtlCol="0" anchor="ctr"/>
+          <a:lstStyle/>
+          <a:p>
+            <a:pPr algn="ctr"/>
+            <a:endParaRPr lang="ru-RU"/>
+          </a:p>
+        </p:txBody>
+      </p:sp>
+      <p:sp>
+        <p:nvSpPr>
+          <p:cNvPr id="7" name="Прямоугольник 6"/>
+          <p:cNvSpPr/>
+          <p:nvPr/>
+        </p:nvSpPr>
+        <p:spPr>
+          <a:xfrm>
+            <a:off x="6516216" y="2648223"/>
+            <a:ext cx="1008112" cy="1152128"/>
+          </a:xfrm>
+          <a:prstGeom prst="rect">
+            <a:avLst/>
+          </a:prstGeom>
+          <a:solidFill>
+            <a:srgbClr val="4F81BD">
+              <a:alpha val="30196"/>
+            </a:srgbClr>
+          </a:solidFill>
+          <a:ln>
+            <a:noFill/>
+          </a:ln>
+        </p:spPr>
+        <p:style>
+          <a:lnRef idx="2">
+            <a:schemeClr val="accent1">
+              <a:shade val="50000"/>
+            </a:schemeClr>
+          </a:lnRef>
+          <a:fillRef idx="1">
+            <a:schemeClr val="accent1"/>
+          </a:fillRef>
+          <a:effectRef idx="0">
+            <a:schemeClr val="accent1"/>
+          </a:effectRef>
+          <a:fontRef idx="minor">
+            <a:schemeClr val="lt1"/>
+          </a:fontRef>
+        </p:style>
+        <p:txBody>
+          <a:bodyPr rtlCol="0" anchor="ctr"/>
+          <a:lstStyle/>
+          <a:p>
+            <a:pPr algn="ctr"/>
+            <a:endParaRPr lang="ru-RU"/>
+          </a:p>
+        </p:txBody>
+      </p:sp>
     </p:spTree>
     <p:extLst>
       <p:ext uri="{BB962C8B-B14F-4D97-AF65-F5344CB8AC3E}">
@@ -3738,40 +4216,40 @@
         </p:nvSpPr>
         <p:spPr>
           <a:xfrm>
-            <a:off x="467544" y="4365104"/>
-            <a:ext cx="8352928" cy="1944216"/>
+            <a:off x="251520" y="4365104"/>
+            <a:ext cx="8568952" cy="1584176"/>
           </a:xfrm>
         </p:spPr>
         <p:txBody>
           <a:bodyPr>
-            <a:normAutofit lnSpcReduction="10000"/>
+            <a:normAutofit/>
           </a:bodyPr>
           <a:lstStyle/>
           <a:p>
-            <a:pPr marL="0" indent="0">
+            <a:pPr marL="0" indent="0" algn="just">
               <a:buNone/>
             </a:pPr>
             <a:r>
-              <a:rPr lang="ru-RU" dirty="0" smtClean="0"/>
+              <a:rPr lang="ru-RU" sz="2400" dirty="0" smtClean="0"/>
               <a:t>Математический </a:t>
             </a:r>
             <a:r>
-              <a:rPr lang="ru-RU" dirty="0"/>
+              <a:rPr lang="ru-RU" sz="2400" dirty="0"/>
               <a:t>метод, применяемый для решения различных задач, основанный на минимизации суммы квадратов отклонений некоторых </a:t>
             </a:r>
             <a:r>
-              <a:rPr lang="ru-RU" dirty="0" smtClean="0"/>
+              <a:rPr lang="ru-RU" sz="2400" dirty="0" smtClean="0"/>
               <a:t>функций </a:t>
             </a:r>
             <a:r>
-              <a:rPr lang="ru-RU" dirty="0"/>
+              <a:rPr lang="ru-RU" sz="2400" dirty="0"/>
               <a:t>от искомых </a:t>
             </a:r>
             <a:r>
-              <a:rPr lang="ru-RU" dirty="0" smtClean="0"/>
+              <a:rPr lang="ru-RU" sz="2400" dirty="0" smtClean="0"/>
               <a:t>переменных.</a:t>
             </a:r>
-            <a:endParaRPr lang="ru-RU" dirty="0"/>
+            <a:endParaRPr lang="ru-RU" sz="2400" dirty="0"/>
           </a:p>
         </p:txBody>
       </p:sp>
@@ -3816,6 +4294,196 @@
           </a:extLst>
         </p:spPr>
       </p:pic>
+      <p:sp>
+        <p:nvSpPr>
+          <p:cNvPr id="5" name="Объект 2"/>
+          <p:cNvSpPr txBox="1">
+            <a:spLocks/>
+          </p:cNvSpPr>
+          <p:nvPr/>
+        </p:nvSpPr>
+        <p:spPr>
+          <a:xfrm>
+            <a:off x="277243" y="5589240"/>
+            <a:ext cx="8583884" cy="675456"/>
+          </a:xfrm>
+          <a:prstGeom prst="rect">
+            <a:avLst/>
+          </a:prstGeom>
+        </p:spPr>
+        <p:txBody>
+          <a:bodyPr vert="horz" lIns="91440" tIns="45720" rIns="91440" bIns="45720" rtlCol="0">
+            <a:noAutofit/>
+          </a:bodyPr>
+          <a:lstStyle>
+            <a:lvl1pPr marL="342900" indent="-342900" algn="l" defTabSz="914400" rtl="0" eaLnBrk="1" latinLnBrk="0" hangingPunct="1">
+              <a:spcBef>
+                <a:spcPct val="20000"/>
+              </a:spcBef>
+              <a:buFont typeface="Arial" panose="020B0604020202020204" pitchFamily="34" charset="0"/>
+              <a:buChar char="•"/>
+              <a:defRPr sz="3200" kern="1200">
+                <a:solidFill>
+                  <a:schemeClr val="tx1"/>
+                </a:solidFill>
+                <a:latin typeface="+mn-lt"/>
+                <a:ea typeface="+mn-ea"/>
+                <a:cs typeface="+mn-cs"/>
+              </a:defRPr>
+            </a:lvl1pPr>
+            <a:lvl2pPr marL="742950" indent="-285750" algn="l" defTabSz="914400" rtl="0" eaLnBrk="1" latinLnBrk="0" hangingPunct="1">
+              <a:spcBef>
+                <a:spcPct val="20000"/>
+              </a:spcBef>
+              <a:buFont typeface="Arial" panose="020B0604020202020204" pitchFamily="34" charset="0"/>
+              <a:buChar char="–"/>
+              <a:defRPr sz="2800" kern="1200">
+                <a:solidFill>
+                  <a:schemeClr val="tx1"/>
+                </a:solidFill>
+                <a:latin typeface="+mn-lt"/>
+                <a:ea typeface="+mn-ea"/>
+                <a:cs typeface="+mn-cs"/>
+              </a:defRPr>
+            </a:lvl2pPr>
+            <a:lvl3pPr marL="1143000" indent="-228600" algn="l" defTabSz="914400" rtl="0" eaLnBrk="1" latinLnBrk="0" hangingPunct="1">
+              <a:spcBef>
+                <a:spcPct val="20000"/>
+              </a:spcBef>
+              <a:buFont typeface="Arial" panose="020B0604020202020204" pitchFamily="34" charset="0"/>
+              <a:buChar char="•"/>
+              <a:defRPr sz="2400" kern="1200">
+                <a:solidFill>
+                  <a:schemeClr val="tx1"/>
+                </a:solidFill>
+                <a:latin typeface="+mn-lt"/>
+                <a:ea typeface="+mn-ea"/>
+                <a:cs typeface="+mn-cs"/>
+              </a:defRPr>
+            </a:lvl3pPr>
+            <a:lvl4pPr marL="1600200" indent="-228600" algn="l" defTabSz="914400" rtl="0" eaLnBrk="1" latinLnBrk="0" hangingPunct="1">
+              <a:spcBef>
+                <a:spcPct val="20000"/>
+              </a:spcBef>
+              <a:buFont typeface="Arial" panose="020B0604020202020204" pitchFamily="34" charset="0"/>
+              <a:buChar char="–"/>
+              <a:defRPr sz="2000" kern="1200">
+                <a:solidFill>
+                  <a:schemeClr val="tx1"/>
+                </a:solidFill>
+                <a:latin typeface="+mn-lt"/>
+                <a:ea typeface="+mn-ea"/>
+                <a:cs typeface="+mn-cs"/>
+              </a:defRPr>
+            </a:lvl4pPr>
+            <a:lvl5pPr marL="2057400" indent="-228600" algn="l" defTabSz="914400" rtl="0" eaLnBrk="1" latinLnBrk="0" hangingPunct="1">
+              <a:spcBef>
+                <a:spcPct val="20000"/>
+              </a:spcBef>
+              <a:buFont typeface="Arial" panose="020B0604020202020204" pitchFamily="34" charset="0"/>
+              <a:buChar char="»"/>
+              <a:defRPr sz="2000" kern="1200">
+                <a:solidFill>
+                  <a:schemeClr val="tx1"/>
+                </a:solidFill>
+                <a:latin typeface="+mn-lt"/>
+                <a:ea typeface="+mn-ea"/>
+                <a:cs typeface="+mn-cs"/>
+              </a:defRPr>
+            </a:lvl5pPr>
+            <a:lvl6pPr marL="2514600" indent="-228600" algn="l" defTabSz="914400" rtl="0" eaLnBrk="1" latinLnBrk="0" hangingPunct="1">
+              <a:spcBef>
+                <a:spcPct val="20000"/>
+              </a:spcBef>
+              <a:buFont typeface="Arial" panose="020B0604020202020204" pitchFamily="34" charset="0"/>
+              <a:buChar char="•"/>
+              <a:defRPr sz="2000" kern="1200">
+                <a:solidFill>
+                  <a:schemeClr val="tx1"/>
+                </a:solidFill>
+                <a:latin typeface="+mn-lt"/>
+                <a:ea typeface="+mn-ea"/>
+                <a:cs typeface="+mn-cs"/>
+              </a:defRPr>
+            </a:lvl6pPr>
+            <a:lvl7pPr marL="2971800" indent="-228600" algn="l" defTabSz="914400" rtl="0" eaLnBrk="1" latinLnBrk="0" hangingPunct="1">
+              <a:spcBef>
+                <a:spcPct val="20000"/>
+              </a:spcBef>
+              <a:buFont typeface="Arial" panose="020B0604020202020204" pitchFamily="34" charset="0"/>
+              <a:buChar char="•"/>
+              <a:defRPr sz="2000" kern="1200">
+                <a:solidFill>
+                  <a:schemeClr val="tx1"/>
+                </a:solidFill>
+                <a:latin typeface="+mn-lt"/>
+                <a:ea typeface="+mn-ea"/>
+                <a:cs typeface="+mn-cs"/>
+              </a:defRPr>
+            </a:lvl7pPr>
+            <a:lvl8pPr marL="3429000" indent="-228600" algn="l" defTabSz="914400" rtl="0" eaLnBrk="1" latinLnBrk="0" hangingPunct="1">
+              <a:spcBef>
+                <a:spcPct val="20000"/>
+              </a:spcBef>
+              <a:buFont typeface="Arial" panose="020B0604020202020204" pitchFamily="34" charset="0"/>
+              <a:buChar char="•"/>
+              <a:defRPr sz="2000" kern="1200">
+                <a:solidFill>
+                  <a:schemeClr val="tx1"/>
+                </a:solidFill>
+                <a:latin typeface="+mn-lt"/>
+                <a:ea typeface="+mn-ea"/>
+                <a:cs typeface="+mn-cs"/>
+              </a:defRPr>
+            </a:lvl8pPr>
+            <a:lvl9pPr marL="3886200" indent="-228600" algn="l" defTabSz="914400" rtl="0" eaLnBrk="1" latinLnBrk="0" hangingPunct="1">
+              <a:spcBef>
+                <a:spcPct val="20000"/>
+              </a:spcBef>
+              <a:buFont typeface="Arial" panose="020B0604020202020204" pitchFamily="34" charset="0"/>
+              <a:buChar char="•"/>
+              <a:defRPr sz="2000" kern="1200">
+                <a:solidFill>
+                  <a:schemeClr val="tx1"/>
+                </a:solidFill>
+                <a:latin typeface="+mn-lt"/>
+                <a:ea typeface="+mn-ea"/>
+                <a:cs typeface="+mn-cs"/>
+              </a:defRPr>
+            </a:lvl9pPr>
+          </a:lstStyle>
+          <a:p>
+            <a:pPr marL="0" indent="0" fontAlgn="ctr">
+              <a:buNone/>
+            </a:pPr>
+            <a:r>
+              <a:rPr lang="en-US" sz="1600" dirty="0" smtClean="0"/>
+              <a:t>* J</a:t>
+            </a:r>
+            <a:r>
+              <a:rPr lang="en-US" sz="1600" dirty="0"/>
+              <a:t>. </a:t>
+            </a:r>
+            <a:r>
+              <a:rPr lang="en-US" sz="1600" dirty="0" err="1"/>
+              <a:t>Greenacre</a:t>
+            </a:r>
+            <a:r>
+              <a:rPr lang="en-US" sz="1600" dirty="0"/>
+              <a:t>, Michael &amp; W. Browne, Michael. (1986). An efficient alternating least-squares algorithm to perform multidimensional unfolding. </a:t>
+            </a:r>
+            <a:r>
+              <a:rPr lang="en-US" sz="1600" dirty="0" err="1"/>
+              <a:t>Psychometrika</a:t>
+            </a:r>
+            <a:r>
+              <a:rPr lang="en-US" sz="1600" dirty="0"/>
+              <a:t>. 51. 241-250. 10.1007/BF02293982. </a:t>
+            </a:r>
+            <a:endParaRPr lang="ru-RU" sz="1600" dirty="0"/>
+          </a:p>
+        </p:txBody>
+      </p:sp>
     </p:spTree>
     <p:extLst>
       <p:ext uri="{BB962C8B-B14F-4D97-AF65-F5344CB8AC3E}">
@@ -3826,6 +4494,13 @@
   <p:clrMapOvr>
     <a:masterClrMapping/>
   </p:clrMapOvr>
+  <p:timing>
+    <p:tnLst>
+      <p:par>
+        <p:cTn id="1" dur="indefinite" restart="never" nodeType="tmRoot"/>
+      </p:par>
+    </p:tnLst>
+  </p:timing>
 </p:sld>
 </file>
 
@@ -3952,6 +4627,43 @@
           </a:p>
         </p:txBody>
       </p:sp>
+      <p:sp>
+        <p:nvSpPr>
+          <p:cNvPr id="3" name="TextBox 2"/>
+          <p:cNvSpPr txBox="1"/>
+          <p:nvPr/>
+        </p:nvSpPr>
+        <p:spPr>
+          <a:xfrm>
+            <a:off x="539552" y="6229617"/>
+            <a:ext cx="8044222" cy="400110"/>
+          </a:xfrm>
+          <a:prstGeom prst="rect">
+            <a:avLst/>
+          </a:prstGeom>
+          <a:noFill/>
+        </p:spPr>
+        <p:txBody>
+          <a:bodyPr wrap="square" rtlCol="0">
+            <a:spAutoFit/>
+          </a:bodyPr>
+          <a:lstStyle/>
+          <a:p>
+            <a:pPr algn="ctr"/>
+            <a:r>
+              <a:rPr lang="en-US" sz="2000" dirty="0"/>
+              <a:t>https://master-belov.herokuapp.com/</a:t>
+            </a:r>
+            <a:endParaRPr lang="ru-RU" sz="2000" dirty="0">
+              <a:solidFill>
+                <a:schemeClr val="bg1">
+                  <a:lumMod val="65000"/>
+                </a:schemeClr>
+              </a:solidFill>
+            </a:endParaRPr>
+          </a:p>
+        </p:txBody>
+      </p:sp>
     </p:spTree>
     <p:extLst>
       <p:ext uri="{BB962C8B-B14F-4D97-AF65-F5344CB8AC3E}">
@@ -3962,6 +4674,13 @@
   <p:clrMapOvr>
     <a:masterClrMapping/>
   </p:clrMapOvr>
+  <p:timing>
+    <p:tnLst>
+      <p:par>
+        <p:cTn id="1" dur="indefinite" restart="never" nodeType="tmRoot"/>
+      </p:par>
+    </p:tnLst>
+  </p:timing>
 </p:sld>
 </file>
 
@@ -4065,6 +4784,13 @@
   <p:clrMapOvr>
     <a:masterClrMapping/>
   </p:clrMapOvr>
+  <p:timing>
+    <p:tnLst>
+      <p:par>
+        <p:cTn id="1" dur="indefinite" restart="never" nodeType="tmRoot"/>
+      </p:par>
+    </p:tnLst>
+  </p:timing>
 </p:sld>
 </file>
 
@@ -4166,6 +4892,13 @@
   <p:clrMapOvr>
     <a:masterClrMapping/>
   </p:clrMapOvr>
+  <p:timing>
+    <p:tnLst>
+      <p:par>
+        <p:cTn id="1" dur="indefinite" restart="never" nodeType="tmRoot"/>
+      </p:par>
+    </p:tnLst>
+  </p:timing>
 </p:sld>
 </file>
 
@@ -4271,6 +5004,13 @@
   <p:clrMapOvr>
     <a:masterClrMapping/>
   </p:clrMapOvr>
+  <p:timing>
+    <p:tnLst>
+      <p:par>
+        <p:cTn id="1" dur="indefinite" restart="never" nodeType="tmRoot"/>
+      </p:par>
+    </p:tnLst>
+  </p:timing>
 </p:sld>
 </file>
 
@@ -4517,30 +5257,34 @@
           </a:bodyPr>
           <a:lstStyle/>
           <a:p>
-            <a:pPr marL="0" indent="0">
+            <a:pPr marL="0" indent="0" algn="just">
               <a:buNone/>
             </a:pPr>
             <a:r>
+              <a:rPr lang="ru-RU" b="1" dirty="0" smtClean="0"/>
+              <a:t>Цель</a:t>
+            </a:r>
+            <a:r>
               <a:rPr lang="ru-RU" dirty="0" smtClean="0"/>
-              <a:t>Цель – разработка и программная реализация системы сбора и анализа данных социальных сетей</a:t>
+              <a:t> – разработка и программная реализация системы сбора и анализа данных социальных </a:t>
+            </a:r>
+            <a:r>
+              <a:rPr lang="ru-RU" dirty="0" smtClean="0"/>
+              <a:t>сетей.</a:t>
             </a:r>
             <a:endParaRPr lang="en-US" dirty="0" smtClean="0"/>
           </a:p>
           <a:p>
-            <a:pPr marL="0" indent="0">
+            <a:pPr marL="0" indent="0" algn="just">
               <a:buNone/>
             </a:pPr>
             <a:r>
+              <a:rPr lang="ru-RU" b="1" dirty="0" smtClean="0"/>
+              <a:t>Актуальность</a:t>
+            </a:r>
+            <a:r>
               <a:rPr lang="ru-RU" dirty="0" smtClean="0"/>
-              <a:t>Актуальность </a:t>
-            </a:r>
-            <a:r>
-              <a:rPr lang="ru-RU" smtClean="0"/>
-              <a:t>разработки обеспечивается широким </a:t>
-            </a:r>
-            <a:r>
-              <a:rPr lang="ru-RU" dirty="0" smtClean="0"/>
-              <a:t>распространением социальных сетей в сфере общественной жизни и недостаточным количеством инструментов, выполняющих их комплексный анализ.</a:t>
+              <a:t> разработки обеспечивается широким распространением социальных сетей в сфере общественной жизни и недостаточным количеством инструментов, выполняющих их комплексный анализ.</a:t>
             </a:r>
             <a:endParaRPr lang="ru-RU" dirty="0"/>
           </a:p>
@@ -4743,6 +5487,13 @@
   <p:clrMapOvr>
     <a:masterClrMapping/>
   </p:clrMapOvr>
+  <p:timing>
+    <p:tnLst>
+      <p:par>
+        <p:cTn id="1" dur="indefinite" restart="never" nodeType="tmRoot"/>
+      </p:par>
+    </p:tnLst>
+  </p:timing>
 </p:sld>
 </file>
 
@@ -4866,6 +5617,13 @@
   <p:clrMapOvr>
     <a:masterClrMapping/>
   </p:clrMapOvr>
+  <p:timing>
+    <p:tnLst>
+      <p:par>
+        <p:cTn id="1" dur="indefinite" restart="never" nodeType="tmRoot"/>
+      </p:par>
+    </p:tnLst>
+  </p:timing>
 </p:sld>
 </file>
 
@@ -4970,7 +5728,6 @@
               <a:rPr lang="ru-RU" dirty="0"/>
               <a:t> БГУИР, 2017. – [Электронный ресурс]. - Режим доступа : https://libeldoc.bsuir.by/handle/123456789/28949.</a:t>
             </a:r>
-            <a:endParaRPr lang="ru-RU" dirty="0"/>
           </a:p>
           <a:p>
             <a:pPr marL="0" indent="0">
@@ -4990,6 +5747,13 @@
   <p:clrMapOvr>
     <a:masterClrMapping/>
   </p:clrMapOvr>
+  <p:timing>
+    <p:tnLst>
+      <p:par>
+        <p:cTn id="1" dur="indefinite" restart="never" nodeType="tmRoot"/>
+      </p:par>
+    </p:tnLst>
+  </p:timing>
 </p:sld>
 </file>
 
@@ -5048,6 +5812,13 @@
   <p:clrMapOvr>
     <a:masterClrMapping/>
   </p:clrMapOvr>
+  <p:timing>
+    <p:tnLst>
+      <p:par>
+        <p:cTn id="1" dur="indefinite" restart="never" nodeType="tmRoot"/>
+      </p:par>
+    </p:tnLst>
+  </p:timing>
 </p:sld>
 </file>
 
@@ -6044,6 +6815,13 @@
   <p:clrMapOvr>
     <a:masterClrMapping/>
   </p:clrMapOvr>
+  <p:timing>
+    <p:tnLst>
+      <p:par>
+        <p:cTn id="1" dur="indefinite" restart="never" nodeType="tmRoot"/>
+      </p:par>
+    </p:tnLst>
+  </p:timing>
 </p:sld>
 </file>
 
@@ -6220,6 +6998,13 @@
   <p:clrMapOvr>
     <a:masterClrMapping/>
   </p:clrMapOvr>
+  <p:timing>
+    <p:tnLst>
+      <p:par>
+        <p:cTn id="1" dur="indefinite" restart="never" nodeType="tmRoot"/>
+      </p:par>
+    </p:tnLst>
+  </p:timing>
 </p:sld>
 </file>
 
@@ -6316,6 +7101,13 @@
   <p:clrMapOvr>
     <a:masterClrMapping/>
   </p:clrMapOvr>
+  <p:timing>
+    <p:tnLst>
+      <p:par>
+        <p:cTn id="1" dur="indefinite" restart="never" nodeType="tmRoot"/>
+      </p:par>
+    </p:tnLst>
+  </p:timing>
 </p:sld>
 </file>
 

</xml_diff>

<commit_message>
Another fix for presentation
</commit_message>
<xml_diff>
--- a/Презентация.pptx
+++ b/Презентация.pptx
@@ -1,9 +1,12 @@
 
 <file path=ppt/presentation.xml><?xml version="1.0" encoding="utf-8"?>
-<p:presentation xmlns:a="http://schemas.openxmlformats.org/drawingml/2006/main" xmlns:r="http://schemas.openxmlformats.org/officeDocument/2006/relationships" xmlns:p="http://schemas.openxmlformats.org/presentationml/2006/main" saveSubsetFonts="1">
+<p:presentation xmlns:a="http://schemas.openxmlformats.org/drawingml/2006/main" xmlns:r="http://schemas.openxmlformats.org/officeDocument/2006/relationships" xmlns:p="http://schemas.openxmlformats.org/presentationml/2006/main" showSpecialPlsOnTitleSld="0" saveSubsetFonts="1">
   <p:sldMasterIdLst>
     <p:sldMasterId id="2147483648" r:id="rId1"/>
   </p:sldMasterIdLst>
+  <p:notesMasterIdLst>
+    <p:notesMasterId r:id="rId26"/>
+  </p:notesMasterIdLst>
   <p:sldIdLst>
     <p:sldId id="256" r:id="rId2"/>
     <p:sldId id="257" r:id="rId3"/>
@@ -130,6 +133,524 @@
 </p:presentation>
 </file>
 
+<file path=ppt/notesMasters/notesMaster1.xml><?xml version="1.0" encoding="utf-8"?>
+<p:notesMaster xmlns:a="http://schemas.openxmlformats.org/drawingml/2006/main" xmlns:r="http://schemas.openxmlformats.org/officeDocument/2006/relationships" xmlns:p="http://schemas.openxmlformats.org/presentationml/2006/main">
+  <p:cSld>
+    <p:bg>
+      <p:bgRef idx="1001">
+        <a:schemeClr val="bg1"/>
+      </p:bgRef>
+    </p:bg>
+    <p:spTree>
+      <p:nvGrpSpPr>
+        <p:cNvPr id="1" name=""/>
+        <p:cNvGrpSpPr/>
+        <p:nvPr/>
+      </p:nvGrpSpPr>
+      <p:grpSpPr>
+        <a:xfrm>
+          <a:off x="0" y="0"/>
+          <a:ext cx="0" cy="0"/>
+          <a:chOff x="0" y="0"/>
+          <a:chExt cx="0" cy="0"/>
+        </a:xfrm>
+      </p:grpSpPr>
+      <p:sp>
+        <p:nvSpPr>
+          <p:cNvPr id="2" name="Верхний колонтитул 1"/>
+          <p:cNvSpPr>
+            <a:spLocks noGrp="1"/>
+          </p:cNvSpPr>
+          <p:nvPr>
+            <p:ph type="hdr" sz="quarter"/>
+          </p:nvPr>
+        </p:nvSpPr>
+        <p:spPr>
+          <a:xfrm>
+            <a:off x="0" y="0"/>
+            <a:ext cx="2971800" cy="457200"/>
+          </a:xfrm>
+          <a:prstGeom prst="rect">
+            <a:avLst/>
+          </a:prstGeom>
+        </p:spPr>
+        <p:txBody>
+          <a:bodyPr vert="horz" lIns="91440" tIns="45720" rIns="91440" bIns="45720" rtlCol="0"/>
+          <a:lstStyle>
+            <a:lvl1pPr algn="l">
+              <a:defRPr sz="1200"/>
+            </a:lvl1pPr>
+          </a:lstStyle>
+          <a:p>
+            <a:endParaRPr lang="ru-RU"/>
+          </a:p>
+        </p:txBody>
+      </p:sp>
+      <p:sp>
+        <p:nvSpPr>
+          <p:cNvPr id="3" name="Дата 2"/>
+          <p:cNvSpPr>
+            <a:spLocks noGrp="1"/>
+          </p:cNvSpPr>
+          <p:nvPr>
+            <p:ph type="dt" idx="1"/>
+          </p:nvPr>
+        </p:nvSpPr>
+        <p:spPr>
+          <a:xfrm>
+            <a:off x="3884613" y="0"/>
+            <a:ext cx="2971800" cy="457200"/>
+          </a:xfrm>
+          <a:prstGeom prst="rect">
+            <a:avLst/>
+          </a:prstGeom>
+        </p:spPr>
+        <p:txBody>
+          <a:bodyPr vert="horz" lIns="91440" tIns="45720" rIns="91440" bIns="45720" rtlCol="0"/>
+          <a:lstStyle>
+            <a:lvl1pPr algn="r">
+              <a:defRPr sz="1200"/>
+            </a:lvl1pPr>
+          </a:lstStyle>
+          <a:p>
+            <a:fld id="{85D89F05-F161-4772-94F1-1E8F01D6D79C}" type="datetimeFigureOut">
+              <a:rPr lang="ru-RU" smtClean="0"/>
+              <a:t>18.01.2018</a:t>
+            </a:fld>
+            <a:endParaRPr lang="ru-RU"/>
+          </a:p>
+        </p:txBody>
+      </p:sp>
+      <p:sp>
+        <p:nvSpPr>
+          <p:cNvPr id="4" name="Образ слайда 3"/>
+          <p:cNvSpPr>
+            <a:spLocks noGrp="1" noRot="1" noChangeAspect="1"/>
+          </p:cNvSpPr>
+          <p:nvPr>
+            <p:ph type="sldImg" idx="2"/>
+          </p:nvPr>
+        </p:nvSpPr>
+        <p:spPr>
+          <a:xfrm>
+            <a:off x="1143000" y="685800"/>
+            <a:ext cx="4572000" cy="3429000"/>
+          </a:xfrm>
+          <a:prstGeom prst="rect">
+            <a:avLst/>
+          </a:prstGeom>
+          <a:noFill/>
+          <a:ln w="12700">
+            <a:solidFill>
+              <a:prstClr val="black"/>
+            </a:solidFill>
+          </a:ln>
+        </p:spPr>
+        <p:txBody>
+          <a:bodyPr vert="horz" lIns="91440" tIns="45720" rIns="91440" bIns="45720" rtlCol="0" anchor="ctr"/>
+          <a:lstStyle/>
+          <a:p>
+            <a:endParaRPr lang="ru-RU"/>
+          </a:p>
+        </p:txBody>
+      </p:sp>
+      <p:sp>
+        <p:nvSpPr>
+          <p:cNvPr id="5" name="Заметки 4"/>
+          <p:cNvSpPr>
+            <a:spLocks noGrp="1"/>
+          </p:cNvSpPr>
+          <p:nvPr>
+            <p:ph type="body" sz="quarter" idx="3"/>
+          </p:nvPr>
+        </p:nvSpPr>
+        <p:spPr>
+          <a:xfrm>
+            <a:off x="685800" y="4343400"/>
+            <a:ext cx="5486400" cy="4114800"/>
+          </a:xfrm>
+          <a:prstGeom prst="rect">
+            <a:avLst/>
+          </a:prstGeom>
+        </p:spPr>
+        <p:txBody>
+          <a:bodyPr vert="horz" lIns="91440" tIns="45720" rIns="91440" bIns="45720" rtlCol="0"/>
+          <a:lstStyle/>
+          <a:p>
+            <a:pPr lvl="0"/>
+            <a:r>
+              <a:rPr lang="ru-RU" smtClean="0"/>
+              <a:t>Образец текста</a:t>
+            </a:r>
+          </a:p>
+          <a:p>
+            <a:pPr lvl="1"/>
+            <a:r>
+              <a:rPr lang="ru-RU" smtClean="0"/>
+              <a:t>Второй уровень</a:t>
+            </a:r>
+          </a:p>
+          <a:p>
+            <a:pPr lvl="2"/>
+            <a:r>
+              <a:rPr lang="ru-RU" smtClean="0"/>
+              <a:t>Третий уровень</a:t>
+            </a:r>
+          </a:p>
+          <a:p>
+            <a:pPr lvl="3"/>
+            <a:r>
+              <a:rPr lang="ru-RU" smtClean="0"/>
+              <a:t>Четвертый уровень</a:t>
+            </a:r>
+          </a:p>
+          <a:p>
+            <a:pPr lvl="4"/>
+            <a:r>
+              <a:rPr lang="ru-RU" smtClean="0"/>
+              <a:t>Пятый уровень</a:t>
+            </a:r>
+            <a:endParaRPr lang="ru-RU"/>
+          </a:p>
+        </p:txBody>
+      </p:sp>
+      <p:sp>
+        <p:nvSpPr>
+          <p:cNvPr id="6" name="Нижний колонтитул 5"/>
+          <p:cNvSpPr>
+            <a:spLocks noGrp="1"/>
+          </p:cNvSpPr>
+          <p:nvPr>
+            <p:ph type="ftr" sz="quarter" idx="4"/>
+          </p:nvPr>
+        </p:nvSpPr>
+        <p:spPr>
+          <a:xfrm>
+            <a:off x="0" y="8685213"/>
+            <a:ext cx="2971800" cy="457200"/>
+          </a:xfrm>
+          <a:prstGeom prst="rect">
+            <a:avLst/>
+          </a:prstGeom>
+        </p:spPr>
+        <p:txBody>
+          <a:bodyPr vert="horz" lIns="91440" tIns="45720" rIns="91440" bIns="45720" rtlCol="0" anchor="b"/>
+          <a:lstStyle>
+            <a:lvl1pPr algn="l">
+              <a:defRPr sz="1200"/>
+            </a:lvl1pPr>
+          </a:lstStyle>
+          <a:p>
+            <a:endParaRPr lang="ru-RU"/>
+          </a:p>
+        </p:txBody>
+      </p:sp>
+      <p:sp>
+        <p:nvSpPr>
+          <p:cNvPr id="7" name="Номер слайда 6"/>
+          <p:cNvSpPr>
+            <a:spLocks noGrp="1"/>
+          </p:cNvSpPr>
+          <p:nvPr>
+            <p:ph type="sldNum" sz="quarter" idx="5"/>
+          </p:nvPr>
+        </p:nvSpPr>
+        <p:spPr>
+          <a:xfrm>
+            <a:off x="3884613" y="8685213"/>
+            <a:ext cx="2971800" cy="457200"/>
+          </a:xfrm>
+          <a:prstGeom prst="rect">
+            <a:avLst/>
+          </a:prstGeom>
+        </p:spPr>
+        <p:txBody>
+          <a:bodyPr vert="horz" lIns="91440" tIns="45720" rIns="91440" bIns="45720" rtlCol="0" anchor="b"/>
+          <a:lstStyle>
+            <a:lvl1pPr algn="r">
+              <a:defRPr sz="1200"/>
+            </a:lvl1pPr>
+          </a:lstStyle>
+          <a:p>
+            <a:fld id="{23CDF484-97F8-4E07-AFD7-98F7C1447D7F}" type="slidenum">
+              <a:rPr lang="ru-RU" smtClean="0"/>
+              <a:t>‹#›</a:t>
+            </a:fld>
+            <a:endParaRPr lang="ru-RU"/>
+          </a:p>
+        </p:txBody>
+      </p:sp>
+    </p:spTree>
+    <p:extLst>
+      <p:ext uri="{BB962C8B-B14F-4D97-AF65-F5344CB8AC3E}">
+        <p14:creationId xmlns:p14="http://schemas.microsoft.com/office/powerpoint/2010/main" val="2516449929"/>
+      </p:ext>
+    </p:extLst>
+  </p:cSld>
+  <p:clrMap bg1="lt1" tx1="dk1" bg2="lt2" tx2="dk2" accent1="accent1" accent2="accent2" accent3="accent3" accent4="accent4" accent5="accent5" accent6="accent6" hlink="hlink" folHlink="folHlink"/>
+  <p:notesStyle>
+    <a:lvl1pPr marL="0" algn="l" defTabSz="914400" rtl="0" eaLnBrk="1" latinLnBrk="0" hangingPunct="1">
+      <a:defRPr sz="1200" kern="1200">
+        <a:solidFill>
+          <a:schemeClr val="tx1"/>
+        </a:solidFill>
+        <a:latin typeface="+mn-lt"/>
+        <a:ea typeface="+mn-ea"/>
+        <a:cs typeface="+mn-cs"/>
+      </a:defRPr>
+    </a:lvl1pPr>
+    <a:lvl2pPr marL="457200" algn="l" defTabSz="914400" rtl="0" eaLnBrk="1" latinLnBrk="0" hangingPunct="1">
+      <a:defRPr sz="1200" kern="1200">
+        <a:solidFill>
+          <a:schemeClr val="tx1"/>
+        </a:solidFill>
+        <a:latin typeface="+mn-lt"/>
+        <a:ea typeface="+mn-ea"/>
+        <a:cs typeface="+mn-cs"/>
+      </a:defRPr>
+    </a:lvl2pPr>
+    <a:lvl3pPr marL="914400" algn="l" defTabSz="914400" rtl="0" eaLnBrk="1" latinLnBrk="0" hangingPunct="1">
+      <a:defRPr sz="1200" kern="1200">
+        <a:solidFill>
+          <a:schemeClr val="tx1"/>
+        </a:solidFill>
+        <a:latin typeface="+mn-lt"/>
+        <a:ea typeface="+mn-ea"/>
+        <a:cs typeface="+mn-cs"/>
+      </a:defRPr>
+    </a:lvl3pPr>
+    <a:lvl4pPr marL="1371600" algn="l" defTabSz="914400" rtl="0" eaLnBrk="1" latinLnBrk="0" hangingPunct="1">
+      <a:defRPr sz="1200" kern="1200">
+        <a:solidFill>
+          <a:schemeClr val="tx1"/>
+        </a:solidFill>
+        <a:latin typeface="+mn-lt"/>
+        <a:ea typeface="+mn-ea"/>
+        <a:cs typeface="+mn-cs"/>
+      </a:defRPr>
+    </a:lvl4pPr>
+    <a:lvl5pPr marL="1828800" algn="l" defTabSz="914400" rtl="0" eaLnBrk="1" latinLnBrk="0" hangingPunct="1">
+      <a:defRPr sz="1200" kern="1200">
+        <a:solidFill>
+          <a:schemeClr val="tx1"/>
+        </a:solidFill>
+        <a:latin typeface="+mn-lt"/>
+        <a:ea typeface="+mn-ea"/>
+        <a:cs typeface="+mn-cs"/>
+      </a:defRPr>
+    </a:lvl5pPr>
+    <a:lvl6pPr marL="2286000" algn="l" defTabSz="914400" rtl="0" eaLnBrk="1" latinLnBrk="0" hangingPunct="1">
+      <a:defRPr sz="1200" kern="1200">
+        <a:solidFill>
+          <a:schemeClr val="tx1"/>
+        </a:solidFill>
+        <a:latin typeface="+mn-lt"/>
+        <a:ea typeface="+mn-ea"/>
+        <a:cs typeface="+mn-cs"/>
+      </a:defRPr>
+    </a:lvl6pPr>
+    <a:lvl7pPr marL="2743200" algn="l" defTabSz="914400" rtl="0" eaLnBrk="1" latinLnBrk="0" hangingPunct="1">
+      <a:defRPr sz="1200" kern="1200">
+        <a:solidFill>
+          <a:schemeClr val="tx1"/>
+        </a:solidFill>
+        <a:latin typeface="+mn-lt"/>
+        <a:ea typeface="+mn-ea"/>
+        <a:cs typeface="+mn-cs"/>
+      </a:defRPr>
+    </a:lvl7pPr>
+    <a:lvl8pPr marL="3200400" algn="l" defTabSz="914400" rtl="0" eaLnBrk="1" latinLnBrk="0" hangingPunct="1">
+      <a:defRPr sz="1200" kern="1200">
+        <a:solidFill>
+          <a:schemeClr val="tx1"/>
+        </a:solidFill>
+        <a:latin typeface="+mn-lt"/>
+        <a:ea typeface="+mn-ea"/>
+        <a:cs typeface="+mn-cs"/>
+      </a:defRPr>
+    </a:lvl8pPr>
+    <a:lvl9pPr marL="3657600" algn="l" defTabSz="914400" rtl="0" eaLnBrk="1" latinLnBrk="0" hangingPunct="1">
+      <a:defRPr sz="1200" kern="1200">
+        <a:solidFill>
+          <a:schemeClr val="tx1"/>
+        </a:solidFill>
+        <a:latin typeface="+mn-lt"/>
+        <a:ea typeface="+mn-ea"/>
+        <a:cs typeface="+mn-cs"/>
+      </a:defRPr>
+    </a:lvl9pPr>
+  </p:notesStyle>
+</p:notesMaster>
+</file>
+
+<file path=ppt/notesSlides/notesSlide1.xml><?xml version="1.0" encoding="utf-8"?>
+<p:notes xmlns:a="http://schemas.openxmlformats.org/drawingml/2006/main" xmlns:r="http://schemas.openxmlformats.org/officeDocument/2006/relationships" xmlns:p="http://schemas.openxmlformats.org/presentationml/2006/main">
+  <p:cSld>
+    <p:spTree>
+      <p:nvGrpSpPr>
+        <p:cNvPr id="1" name=""/>
+        <p:cNvGrpSpPr/>
+        <p:nvPr/>
+      </p:nvGrpSpPr>
+      <p:grpSpPr>
+        <a:xfrm>
+          <a:off x="0" y="0"/>
+          <a:ext cx="0" cy="0"/>
+          <a:chOff x="0" y="0"/>
+          <a:chExt cx="0" cy="0"/>
+        </a:xfrm>
+      </p:grpSpPr>
+      <p:sp>
+        <p:nvSpPr>
+          <p:cNvPr id="2" name="Образ слайда 1"/>
+          <p:cNvSpPr>
+            <a:spLocks noGrp="1" noRot="1" noChangeAspect="1"/>
+          </p:cNvSpPr>
+          <p:nvPr>
+            <p:ph type="sldImg"/>
+          </p:nvPr>
+        </p:nvSpPr>
+        <p:spPr/>
+      </p:sp>
+      <p:sp>
+        <p:nvSpPr>
+          <p:cNvPr id="3" name="Заметки 2"/>
+          <p:cNvSpPr>
+            <a:spLocks noGrp="1"/>
+          </p:cNvSpPr>
+          <p:nvPr>
+            <p:ph type="body" idx="1"/>
+          </p:nvPr>
+        </p:nvSpPr>
+        <p:spPr/>
+        <p:txBody>
+          <a:bodyPr/>
+          <a:lstStyle/>
+          <a:p>
+            <a:endParaRPr lang="ru-RU"/>
+          </a:p>
+        </p:txBody>
+      </p:sp>
+      <p:sp>
+        <p:nvSpPr>
+          <p:cNvPr id="4" name="Номер слайда 3"/>
+          <p:cNvSpPr>
+            <a:spLocks noGrp="1"/>
+          </p:cNvSpPr>
+          <p:nvPr>
+            <p:ph type="sldNum" sz="quarter" idx="10"/>
+          </p:nvPr>
+        </p:nvSpPr>
+        <p:spPr/>
+        <p:txBody>
+          <a:bodyPr/>
+          <a:lstStyle/>
+          <a:p>
+            <a:fld id="{23CDF484-97F8-4E07-AFD7-98F7C1447D7F}" type="slidenum">
+              <a:rPr lang="ru-RU" smtClean="0"/>
+              <a:t>1</a:t>
+            </a:fld>
+            <a:endParaRPr lang="ru-RU"/>
+          </a:p>
+        </p:txBody>
+      </p:sp>
+    </p:spTree>
+    <p:extLst>
+      <p:ext uri="{BB962C8B-B14F-4D97-AF65-F5344CB8AC3E}">
+        <p14:creationId xmlns:p14="http://schemas.microsoft.com/office/powerpoint/2010/main" val="4063031597"/>
+      </p:ext>
+    </p:extLst>
+  </p:cSld>
+  <p:clrMapOvr>
+    <a:masterClrMapping/>
+  </p:clrMapOvr>
+</p:notes>
+</file>
+
+<file path=ppt/notesSlides/notesSlide2.xml><?xml version="1.0" encoding="utf-8"?>
+<p:notes xmlns:a="http://schemas.openxmlformats.org/drawingml/2006/main" xmlns:r="http://schemas.openxmlformats.org/officeDocument/2006/relationships" xmlns:p="http://schemas.openxmlformats.org/presentationml/2006/main">
+  <p:cSld>
+    <p:spTree>
+      <p:nvGrpSpPr>
+        <p:cNvPr id="1" name=""/>
+        <p:cNvGrpSpPr/>
+        <p:nvPr/>
+      </p:nvGrpSpPr>
+      <p:grpSpPr>
+        <a:xfrm>
+          <a:off x="0" y="0"/>
+          <a:ext cx="0" cy="0"/>
+          <a:chOff x="0" y="0"/>
+          <a:chExt cx="0" cy="0"/>
+        </a:xfrm>
+      </p:grpSpPr>
+      <p:sp>
+        <p:nvSpPr>
+          <p:cNvPr id="2" name="Образ слайда 1"/>
+          <p:cNvSpPr>
+            <a:spLocks noGrp="1" noRot="1" noChangeAspect="1"/>
+          </p:cNvSpPr>
+          <p:nvPr>
+            <p:ph type="sldImg"/>
+          </p:nvPr>
+        </p:nvSpPr>
+        <p:spPr/>
+      </p:sp>
+      <p:sp>
+        <p:nvSpPr>
+          <p:cNvPr id="3" name="Заметки 2"/>
+          <p:cNvSpPr>
+            <a:spLocks noGrp="1"/>
+          </p:cNvSpPr>
+          <p:nvPr>
+            <p:ph type="body" idx="1"/>
+          </p:nvPr>
+        </p:nvSpPr>
+        <p:spPr/>
+        <p:txBody>
+          <a:bodyPr/>
+          <a:lstStyle/>
+          <a:p>
+            <a:endParaRPr lang="ru-RU"/>
+          </a:p>
+        </p:txBody>
+      </p:sp>
+      <p:sp>
+        <p:nvSpPr>
+          <p:cNvPr id="4" name="Номер слайда 3"/>
+          <p:cNvSpPr>
+            <a:spLocks noGrp="1"/>
+          </p:cNvSpPr>
+          <p:nvPr>
+            <p:ph type="sldNum" sz="quarter" idx="10"/>
+          </p:nvPr>
+        </p:nvSpPr>
+        <p:spPr/>
+        <p:txBody>
+          <a:bodyPr/>
+          <a:lstStyle/>
+          <a:p>
+            <a:fld id="{23CDF484-97F8-4E07-AFD7-98F7C1447D7F}" type="slidenum">
+              <a:rPr lang="ru-RU" smtClean="0"/>
+              <a:t>2</a:t>
+            </a:fld>
+            <a:endParaRPr lang="ru-RU"/>
+          </a:p>
+        </p:txBody>
+      </p:sp>
+    </p:spTree>
+    <p:extLst>
+      <p:ext uri="{BB962C8B-B14F-4D97-AF65-F5344CB8AC3E}">
+        <p14:creationId xmlns:p14="http://schemas.microsoft.com/office/powerpoint/2010/main" val="1805578121"/>
+      </p:ext>
+    </p:extLst>
+  </p:cSld>
+  <p:clrMapOvr>
+    <a:masterClrMapping/>
+  </p:clrMapOvr>
+</p:notes>
+</file>
+
 <file path=ppt/slideLayouts/slideLayout1.xml><?xml version="1.0" encoding="utf-8"?>
 <p:sldLayout xmlns:a="http://schemas.openxmlformats.org/drawingml/2006/main" xmlns:r="http://schemas.openxmlformats.org/officeDocument/2006/relationships" xmlns:p="http://schemas.openxmlformats.org/presentationml/2006/main" type="title" preserve="1">
   <p:cSld name="Титульный слайд">
@@ -309,9 +830,9 @@
           <a:bodyPr/>
           <a:lstStyle/>
           <a:p>
-            <a:fld id="{6C844F76-6A9F-4673-9E5B-11DA2C86978C}" type="datetimeFigureOut">
-              <a:rPr lang="ru-RU" smtClean="0"/>
-              <a:t>17.01.2018</a:t>
+            <a:fld id="{A22A401E-6671-49A3-BDB4-A90A87E44B79}" type="datetime1">
+              <a:rPr lang="ru-RU" smtClean="0"/>
+              <a:t>18.01.2018</a:t>
             </a:fld>
             <a:endParaRPr lang="ru-RU"/>
           </a:p>
@@ -355,7 +876,7 @@
               <a:rPr lang="ru-RU" smtClean="0"/>
               <a:t>‹#›</a:t>
             </a:fld>
-            <a:endParaRPr lang="ru-RU"/>
+            <a:endParaRPr lang="ru-RU" dirty="0"/>
           </a:p>
         </p:txBody>
       </p:sp>
@@ -369,6 +890,13 @@
   <p:clrMapOvr>
     <a:masterClrMapping/>
   </p:clrMapOvr>
+  <p:timing>
+    <p:tnLst>
+      <p:par>
+        <p:cTn id="1" dur="indefinite" restart="never" nodeType="tmRoot"/>
+      </p:par>
+    </p:tnLst>
+  </p:timing>
 </p:sldLayout>
 </file>
 
@@ -479,9 +1007,9 @@
           <a:bodyPr/>
           <a:lstStyle/>
           <a:p>
-            <a:fld id="{6C844F76-6A9F-4673-9E5B-11DA2C86978C}" type="datetimeFigureOut">
-              <a:rPr lang="ru-RU" smtClean="0"/>
-              <a:t>17.01.2018</a:t>
+            <a:fld id="{05AA6357-3BE2-432E-A11D-B2A21AA7B94A}" type="datetime1">
+              <a:rPr lang="ru-RU" smtClean="0"/>
+              <a:t>18.01.2018</a:t>
             </a:fld>
             <a:endParaRPr lang="ru-RU"/>
           </a:p>
@@ -659,9 +1187,9 @@
           <a:bodyPr/>
           <a:lstStyle/>
           <a:p>
-            <a:fld id="{6C844F76-6A9F-4673-9E5B-11DA2C86978C}" type="datetimeFigureOut">
-              <a:rPr lang="ru-RU" smtClean="0"/>
-              <a:t>17.01.2018</a:t>
+            <a:fld id="{86FD4DF6-7C41-4EBC-870C-1F2FDE20A0C2}" type="datetime1">
+              <a:rPr lang="ru-RU" smtClean="0"/>
+              <a:t>18.01.2018</a:t>
             </a:fld>
             <a:endParaRPr lang="ru-RU"/>
           </a:p>
@@ -829,9 +1357,9 @@
           <a:bodyPr/>
           <a:lstStyle/>
           <a:p>
-            <a:fld id="{6C844F76-6A9F-4673-9E5B-11DA2C86978C}" type="datetimeFigureOut">
-              <a:rPr lang="ru-RU" smtClean="0"/>
-              <a:t>17.01.2018</a:t>
+            <a:fld id="{B23EE1C0-E027-415A-BD36-F84ABA274E4F}" type="datetime1">
+              <a:rPr lang="ru-RU" smtClean="0"/>
+              <a:t>18.01.2018</a:t>
             </a:fld>
             <a:endParaRPr lang="ru-RU"/>
           </a:p>
@@ -869,13 +1397,18 @@
         <p:spPr/>
         <p:txBody>
           <a:bodyPr/>
-          <a:lstStyle/>
+          <a:lstStyle>
+            <a:lvl1pPr>
+              <a:defRPr sz="2000"/>
+            </a:lvl1pPr>
+          </a:lstStyle>
           <a:p>
             <a:fld id="{1AF1FA71-9C2C-4C19-A9D7-C69366330AE7}" type="slidenum">
               <a:rPr lang="ru-RU" smtClean="0"/>
+              <a:pPr/>
               <a:t>‹#›</a:t>
             </a:fld>
-            <a:endParaRPr lang="ru-RU"/>
+            <a:endParaRPr lang="ru-RU" dirty="0"/>
           </a:p>
         </p:txBody>
       </p:sp>
@@ -889,6 +1422,13 @@
   <p:clrMapOvr>
     <a:masterClrMapping/>
   </p:clrMapOvr>
+  <p:timing>
+    <p:tnLst>
+      <p:par>
+        <p:cTn id="1" dur="indefinite" restart="never" nodeType="tmRoot"/>
+      </p:par>
+    </p:tnLst>
+  </p:timing>
 </p:sldLayout>
 </file>
 
@@ -1075,9 +1615,9 @@
           <a:bodyPr/>
           <a:lstStyle/>
           <a:p>
-            <a:fld id="{6C844F76-6A9F-4673-9E5B-11DA2C86978C}" type="datetimeFigureOut">
-              <a:rPr lang="ru-RU" smtClean="0"/>
-              <a:t>17.01.2018</a:t>
+            <a:fld id="{4BAA0A00-BD7A-4E53-ACBC-1C3BD3D32669}" type="datetime1">
+              <a:rPr lang="ru-RU" smtClean="0"/>
+              <a:t>18.01.2018</a:t>
             </a:fld>
             <a:endParaRPr lang="ru-RU"/>
           </a:p>
@@ -1363,9 +1903,9 @@
           <a:bodyPr/>
           <a:lstStyle/>
           <a:p>
-            <a:fld id="{6C844F76-6A9F-4673-9E5B-11DA2C86978C}" type="datetimeFigureOut">
-              <a:rPr lang="ru-RU" smtClean="0"/>
-              <a:t>17.01.2018</a:t>
+            <a:fld id="{FB1BE18D-C16E-4E94-9FAF-3AA822F62580}" type="datetime1">
+              <a:rPr lang="ru-RU" smtClean="0"/>
+              <a:t>18.01.2018</a:t>
             </a:fld>
             <a:endParaRPr lang="ru-RU"/>
           </a:p>
@@ -1785,9 +2325,9 @@
           <a:bodyPr/>
           <a:lstStyle/>
           <a:p>
-            <a:fld id="{6C844F76-6A9F-4673-9E5B-11DA2C86978C}" type="datetimeFigureOut">
-              <a:rPr lang="ru-RU" smtClean="0"/>
-              <a:t>17.01.2018</a:t>
+            <a:fld id="{C705589E-D59E-47C2-AA79-BEC8CB3DAB2B}" type="datetime1">
+              <a:rPr lang="ru-RU" smtClean="0"/>
+              <a:t>18.01.2018</a:t>
             </a:fld>
             <a:endParaRPr lang="ru-RU"/>
           </a:p>
@@ -1903,9 +2443,9 @@
           <a:bodyPr/>
           <a:lstStyle/>
           <a:p>
-            <a:fld id="{6C844F76-6A9F-4673-9E5B-11DA2C86978C}" type="datetimeFigureOut">
-              <a:rPr lang="ru-RU" smtClean="0"/>
-              <a:t>17.01.2018</a:t>
+            <a:fld id="{3793526B-8C84-4506-BA49-B60E40F1141D}" type="datetime1">
+              <a:rPr lang="ru-RU" smtClean="0"/>
+              <a:t>18.01.2018</a:t>
             </a:fld>
             <a:endParaRPr lang="ru-RU"/>
           </a:p>
@@ -1998,9 +2538,9 @@
           <a:bodyPr/>
           <a:lstStyle/>
           <a:p>
-            <a:fld id="{6C844F76-6A9F-4673-9E5B-11DA2C86978C}" type="datetimeFigureOut">
-              <a:rPr lang="ru-RU" smtClean="0"/>
-              <a:t>17.01.2018</a:t>
+            <a:fld id="{1CAC847E-F09C-47CD-B122-737DBB24F3B8}" type="datetime1">
+              <a:rPr lang="ru-RU" smtClean="0"/>
+              <a:t>18.01.2018</a:t>
             </a:fld>
             <a:endParaRPr lang="ru-RU"/>
           </a:p>
@@ -2275,9 +2815,9 @@
           <a:bodyPr/>
           <a:lstStyle/>
           <a:p>
-            <a:fld id="{6C844F76-6A9F-4673-9E5B-11DA2C86978C}" type="datetimeFigureOut">
-              <a:rPr lang="ru-RU" smtClean="0"/>
-              <a:t>17.01.2018</a:t>
+            <a:fld id="{E99914ED-4F48-4F17-AACA-F21BD9C0405C}" type="datetime1">
+              <a:rPr lang="ru-RU" smtClean="0"/>
+              <a:t>18.01.2018</a:t>
             </a:fld>
             <a:endParaRPr lang="ru-RU"/>
           </a:p>
@@ -2528,9 +3068,9 @@
           <a:bodyPr/>
           <a:lstStyle/>
           <a:p>
-            <a:fld id="{6C844F76-6A9F-4673-9E5B-11DA2C86978C}" type="datetimeFigureOut">
-              <a:rPr lang="ru-RU" smtClean="0"/>
-              <a:t>17.01.2018</a:t>
+            <a:fld id="{7A5BB1AA-03AE-41E7-815E-621B0061994C}" type="datetime1">
+              <a:rPr lang="ru-RU" smtClean="0"/>
+              <a:t>18.01.2018</a:t>
             </a:fld>
             <a:endParaRPr lang="ru-RU"/>
           </a:p>
@@ -2741,9 +3281,9 @@
             </a:lvl1pPr>
           </a:lstStyle>
           <a:p>
-            <a:fld id="{6C844F76-6A9F-4673-9E5B-11DA2C86978C}" type="datetimeFigureOut">
-              <a:rPr lang="ru-RU" smtClean="0"/>
-              <a:t>17.01.2018</a:t>
+            <a:fld id="{A9648C57-4928-479C-8088-A0E94D1AB6CA}" type="datetime1">
+              <a:rPr lang="ru-RU" smtClean="0"/>
+              <a:t>18.01.2018</a:t>
             </a:fld>
             <a:endParaRPr lang="ru-RU"/>
           </a:p>
@@ -2848,6 +3388,7 @@
     <p:sldLayoutId id="2147483658" r:id="rId10"/>
     <p:sldLayoutId id="2147483659" r:id="rId11"/>
   </p:sldLayoutIdLst>
+  <p:hf hdr="0" ftr="0" dt="0"/>
   <p:txStyles>
     <p:titleStyle>
       <a:lvl1pPr algn="ctr" defTabSz="914400" rtl="0" eaLnBrk="1" latinLnBrk="0" hangingPunct="1">
@@ -3169,9 +3710,7 @@
             <a:r>
               <a:rPr lang="ru-RU" sz="2600" dirty="0" smtClean="0">
                 <a:solidFill>
-                  <a:schemeClr val="bg1">
-                    <a:lumMod val="65000"/>
-                  </a:schemeClr>
+                  <a:schemeClr val="tx1"/>
                 </a:solidFill>
               </a:rPr>
               <a:t>Магистрант:</a:t>
@@ -3179,9 +3718,7 @@
             <a:r>
               <a:rPr lang="ru-RU" sz="2600" dirty="0">
                 <a:solidFill>
-                  <a:schemeClr val="bg1">
-                    <a:lumMod val="65000"/>
-                  </a:schemeClr>
+                  <a:schemeClr val="tx1"/>
                 </a:solidFill>
               </a:rPr>
               <a:t>		</a:t>
@@ -3189,9 +3726,7 @@
             <a:r>
               <a:rPr lang="ru-RU" sz="2600" dirty="0" smtClean="0">
                 <a:solidFill>
-                  <a:schemeClr val="bg1">
-                    <a:lumMod val="65000"/>
-                  </a:schemeClr>
+                  <a:schemeClr val="tx1"/>
                 </a:solidFill>
               </a:rPr>
               <a:t>Белов А.В</a:t>
@@ -3199,9 +3734,7 @@
             <a:r>
               <a:rPr lang="ru-RU" sz="2600" dirty="0">
                 <a:solidFill>
-                  <a:schemeClr val="bg1">
-                    <a:lumMod val="65000"/>
-                  </a:schemeClr>
+                  <a:schemeClr val="tx1"/>
                 </a:solidFill>
               </a:rPr>
               <a:t>.</a:t>
@@ -3214,9 +3747,7 @@
             <a:r>
               <a:rPr lang="ru-RU" sz="2600" dirty="0">
                 <a:solidFill>
-                  <a:schemeClr val="bg1">
-                    <a:lumMod val="65000"/>
-                  </a:schemeClr>
+                  <a:schemeClr val="tx1"/>
                 </a:solidFill>
               </a:rPr>
               <a:t>Руководитель:	</a:t>
@@ -3224,9 +3755,7 @@
             <a:r>
               <a:rPr lang="ru-RU" sz="2600" dirty="0" smtClean="0">
                 <a:solidFill>
-                  <a:schemeClr val="bg1">
-                    <a:lumMod val="65000"/>
-                  </a:schemeClr>
+                  <a:schemeClr val="tx1"/>
                 </a:solidFill>
               </a:rPr>
               <a:t>доцент, к.т.н.</a:t>
@@ -3239,9 +3768,7 @@
             <a:r>
               <a:rPr lang="ru-RU" sz="2600" dirty="0">
                 <a:solidFill>
-                  <a:schemeClr val="bg1">
-                    <a:lumMod val="65000"/>
-                  </a:schemeClr>
+                  <a:schemeClr val="tx1"/>
                 </a:solidFill>
               </a:rPr>
               <a:t>	</a:t>
@@ -3249,9 +3776,7 @@
             <a:r>
               <a:rPr lang="ru-RU" sz="2600" dirty="0" smtClean="0">
                 <a:solidFill>
-                  <a:schemeClr val="bg1">
-                    <a:lumMod val="65000"/>
-                  </a:schemeClr>
+                  <a:schemeClr val="tx1"/>
                 </a:solidFill>
               </a:rPr>
               <a:t>		Лукашевич М.М</a:t>
@@ -3259,9 +3784,7 @@
             <a:r>
               <a:rPr lang="ru-RU" sz="2600" dirty="0">
                 <a:solidFill>
-                  <a:schemeClr val="bg1">
-                    <a:lumMod val="65000"/>
-                  </a:schemeClr>
+                  <a:schemeClr val="tx1"/>
                 </a:solidFill>
               </a:rPr>
               <a:t>.</a:t>
@@ -3270,9 +3793,7 @@
           <a:p>
             <a:endParaRPr lang="ru-RU" sz="2600" dirty="0">
               <a:solidFill>
-                <a:schemeClr val="bg1">
-                  <a:lumMod val="65000"/>
-                </a:schemeClr>
+                <a:schemeClr val="tx1"/>
               </a:solidFill>
             </a:endParaRPr>
           </a:p>
@@ -3317,22 +3838,10 @@
           </a:lstStyle>
           <a:p>
             <a:r>
-              <a:rPr lang="ru-RU" sz="1600" dirty="0" smtClean="0">
-                <a:solidFill>
-                  <a:schemeClr val="bg1">
-                    <a:lumMod val="65000"/>
-                  </a:schemeClr>
-                </a:solidFill>
-              </a:rPr>
+              <a:rPr lang="ru-RU" sz="1600" dirty="0" smtClean="0"/>
               <a:t>Специальность 1 – 40 81 02 «Технологии виртуализации и облачных вычислений»</a:t>
             </a:r>
-            <a:endParaRPr lang="ru-RU" sz="1600" dirty="0">
-              <a:solidFill>
-                <a:schemeClr val="bg1">
-                  <a:lumMod val="65000"/>
-                </a:schemeClr>
-              </a:solidFill>
-            </a:endParaRPr>
+            <a:endParaRPr lang="ru-RU" sz="1600" dirty="0"/>
           </a:p>
         </p:txBody>
       </p:sp>
@@ -3578,6 +4087,29 @@
           </a:extLst>
         </p:spPr>
       </p:pic>
+      <p:sp>
+        <p:nvSpPr>
+          <p:cNvPr id="3" name="Номер слайда 2"/>
+          <p:cNvSpPr>
+            <a:spLocks noGrp="1"/>
+          </p:cNvSpPr>
+          <p:nvPr>
+            <p:ph type="sldNum" sz="quarter" idx="12"/>
+          </p:nvPr>
+        </p:nvSpPr>
+        <p:spPr/>
+        <p:txBody>
+          <a:bodyPr/>
+          <a:lstStyle/>
+          <a:p>
+            <a:fld id="{1AF1FA71-9C2C-4C19-A9D7-C69366330AE7}" type="slidenum">
+              <a:rPr lang="ru-RU" smtClean="0"/>
+              <a:t>10</a:t>
+            </a:fld>
+            <a:endParaRPr lang="ru-RU"/>
+          </a:p>
+        </p:txBody>
+      </p:sp>
     </p:spTree>
     <p:extLst>
       <p:ext uri="{BB962C8B-B14F-4D97-AF65-F5344CB8AC3E}">
@@ -3836,6 +4368,29 @@
           </a:p>
         </p:txBody>
       </p:sp>
+      <p:sp>
+        <p:nvSpPr>
+          <p:cNvPr id="4" name="Номер слайда 3"/>
+          <p:cNvSpPr>
+            <a:spLocks noGrp="1"/>
+          </p:cNvSpPr>
+          <p:nvPr>
+            <p:ph type="sldNum" sz="quarter" idx="12"/>
+          </p:nvPr>
+        </p:nvSpPr>
+        <p:spPr/>
+        <p:txBody>
+          <a:bodyPr/>
+          <a:lstStyle/>
+          <a:p>
+            <a:fld id="{1AF1FA71-9C2C-4C19-A9D7-C69366330AE7}" type="slidenum">
+              <a:rPr lang="ru-RU" smtClean="0"/>
+              <a:t>11</a:t>
+            </a:fld>
+            <a:endParaRPr lang="ru-RU"/>
+          </a:p>
+        </p:txBody>
+      </p:sp>
     </p:spTree>
     <p:extLst>
       <p:ext uri="{BB962C8B-B14F-4D97-AF65-F5344CB8AC3E}">
@@ -4138,6 +4693,29 @@
           <a:lstStyle/>
           <a:p>
             <a:pPr algn="ctr"/>
+            <a:endParaRPr lang="ru-RU"/>
+          </a:p>
+        </p:txBody>
+      </p:sp>
+      <p:sp>
+        <p:nvSpPr>
+          <p:cNvPr id="3" name="Номер слайда 2"/>
+          <p:cNvSpPr>
+            <a:spLocks noGrp="1"/>
+          </p:cNvSpPr>
+          <p:nvPr>
+            <p:ph type="sldNum" sz="quarter" idx="12"/>
+          </p:nvPr>
+        </p:nvSpPr>
+        <p:spPr/>
+        <p:txBody>
+          <a:bodyPr/>
+          <a:lstStyle/>
+          <a:p>
+            <a:fld id="{1AF1FA71-9C2C-4C19-A9D7-C69366330AE7}" type="slidenum">
+              <a:rPr lang="ru-RU" smtClean="0"/>
+              <a:t>12</a:t>
+            </a:fld>
             <a:endParaRPr lang="ru-RU"/>
           </a:p>
         </p:txBody>
@@ -4484,6 +5062,29 @@
           </a:p>
         </p:txBody>
       </p:sp>
+      <p:sp>
+        <p:nvSpPr>
+          <p:cNvPr id="4" name="Номер слайда 3"/>
+          <p:cNvSpPr>
+            <a:spLocks noGrp="1"/>
+          </p:cNvSpPr>
+          <p:nvPr>
+            <p:ph type="sldNum" sz="quarter" idx="12"/>
+          </p:nvPr>
+        </p:nvSpPr>
+        <p:spPr/>
+        <p:txBody>
+          <a:bodyPr/>
+          <a:lstStyle/>
+          <a:p>
+            <a:fld id="{1AF1FA71-9C2C-4C19-A9D7-C69366330AE7}" type="slidenum">
+              <a:rPr lang="ru-RU" smtClean="0"/>
+              <a:t>13</a:t>
+            </a:fld>
+            <a:endParaRPr lang="ru-RU"/>
+          </a:p>
+        </p:txBody>
+      </p:sp>
     </p:spTree>
     <p:extLst>
       <p:ext uri="{BB962C8B-B14F-4D97-AF65-F5344CB8AC3E}">
@@ -4664,6 +5265,29 @@
           </a:p>
         </p:txBody>
       </p:sp>
+      <p:sp>
+        <p:nvSpPr>
+          <p:cNvPr id="4" name="Номер слайда 3"/>
+          <p:cNvSpPr>
+            <a:spLocks noGrp="1"/>
+          </p:cNvSpPr>
+          <p:nvPr>
+            <p:ph type="sldNum" sz="quarter" idx="12"/>
+          </p:nvPr>
+        </p:nvSpPr>
+        <p:spPr/>
+        <p:txBody>
+          <a:bodyPr/>
+          <a:lstStyle/>
+          <a:p>
+            <a:fld id="{1AF1FA71-9C2C-4C19-A9D7-C69366330AE7}" type="slidenum">
+              <a:rPr lang="ru-RU" smtClean="0"/>
+              <a:t>14</a:t>
+            </a:fld>
+            <a:endParaRPr lang="ru-RU"/>
+          </a:p>
+        </p:txBody>
+      </p:sp>
     </p:spTree>
     <p:extLst>
       <p:ext uri="{BB962C8B-B14F-4D97-AF65-F5344CB8AC3E}">
@@ -4774,6 +5398,29 @@
           </a:extLst>
         </p:spPr>
       </p:pic>
+      <p:sp>
+        <p:nvSpPr>
+          <p:cNvPr id="3" name="Номер слайда 2"/>
+          <p:cNvSpPr>
+            <a:spLocks noGrp="1"/>
+          </p:cNvSpPr>
+          <p:nvPr>
+            <p:ph type="sldNum" sz="quarter" idx="12"/>
+          </p:nvPr>
+        </p:nvSpPr>
+        <p:spPr/>
+        <p:txBody>
+          <a:bodyPr/>
+          <a:lstStyle/>
+          <a:p>
+            <a:fld id="{1AF1FA71-9C2C-4C19-A9D7-C69366330AE7}" type="slidenum">
+              <a:rPr lang="ru-RU" smtClean="0"/>
+              <a:t>15</a:t>
+            </a:fld>
+            <a:endParaRPr lang="ru-RU"/>
+          </a:p>
+        </p:txBody>
+      </p:sp>
     </p:spTree>
     <p:extLst>
       <p:ext uri="{BB962C8B-B14F-4D97-AF65-F5344CB8AC3E}">
@@ -4882,6 +5529,29 @@
           </a:extLst>
         </p:spPr>
       </p:pic>
+      <p:sp>
+        <p:nvSpPr>
+          <p:cNvPr id="3" name="Номер слайда 2"/>
+          <p:cNvSpPr>
+            <a:spLocks noGrp="1"/>
+          </p:cNvSpPr>
+          <p:nvPr>
+            <p:ph type="sldNum" sz="quarter" idx="12"/>
+          </p:nvPr>
+        </p:nvSpPr>
+        <p:spPr/>
+        <p:txBody>
+          <a:bodyPr/>
+          <a:lstStyle/>
+          <a:p>
+            <a:fld id="{1AF1FA71-9C2C-4C19-A9D7-C69366330AE7}" type="slidenum">
+              <a:rPr lang="ru-RU" smtClean="0"/>
+              <a:t>16</a:t>
+            </a:fld>
+            <a:endParaRPr lang="ru-RU"/>
+          </a:p>
+        </p:txBody>
+      </p:sp>
     </p:spTree>
     <p:extLst>
       <p:ext uri="{BB962C8B-B14F-4D97-AF65-F5344CB8AC3E}">
@@ -4994,6 +5664,29 @@
           </a:extLst>
         </p:spPr>
       </p:pic>
+      <p:sp>
+        <p:nvSpPr>
+          <p:cNvPr id="3" name="Номер слайда 2"/>
+          <p:cNvSpPr>
+            <a:spLocks noGrp="1"/>
+          </p:cNvSpPr>
+          <p:nvPr>
+            <p:ph type="sldNum" sz="quarter" idx="12"/>
+          </p:nvPr>
+        </p:nvSpPr>
+        <p:spPr/>
+        <p:txBody>
+          <a:bodyPr/>
+          <a:lstStyle/>
+          <a:p>
+            <a:fld id="{1AF1FA71-9C2C-4C19-A9D7-C69366330AE7}" type="slidenum">
+              <a:rPr lang="ru-RU" smtClean="0"/>
+              <a:t>17</a:t>
+            </a:fld>
+            <a:endParaRPr lang="ru-RU"/>
+          </a:p>
+        </p:txBody>
+      </p:sp>
     </p:spTree>
     <p:extLst>
       <p:ext uri="{BB962C8B-B14F-4D97-AF65-F5344CB8AC3E}">
@@ -5095,6 +5788,29 @@
           </a:extLst>
         </p:spPr>
       </p:pic>
+      <p:sp>
+        <p:nvSpPr>
+          <p:cNvPr id="3" name="Номер слайда 2"/>
+          <p:cNvSpPr>
+            <a:spLocks noGrp="1"/>
+          </p:cNvSpPr>
+          <p:nvPr>
+            <p:ph type="sldNum" sz="quarter" idx="12"/>
+          </p:nvPr>
+        </p:nvSpPr>
+        <p:spPr/>
+        <p:txBody>
+          <a:bodyPr/>
+          <a:lstStyle/>
+          <a:p>
+            <a:fld id="{1AF1FA71-9C2C-4C19-A9D7-C69366330AE7}" type="slidenum">
+              <a:rPr lang="ru-RU" smtClean="0"/>
+              <a:t>18</a:t>
+            </a:fld>
+            <a:endParaRPr lang="ru-RU"/>
+          </a:p>
+        </p:txBody>
+      </p:sp>
     </p:spTree>
     <p:extLst>
       <p:ext uri="{BB962C8B-B14F-4D97-AF65-F5344CB8AC3E}">
@@ -5105,6 +5821,13 @@
   <p:clrMapOvr>
     <a:masterClrMapping/>
   </p:clrMapOvr>
+  <p:timing>
+    <p:tnLst>
+      <p:par>
+        <p:cTn id="1" dur="indefinite" restart="never" nodeType="tmRoot"/>
+      </p:par>
+    </p:tnLst>
+  </p:timing>
 </p:sld>
 </file>
 
@@ -5187,6 +5910,29 @@
           </a:extLst>
         </p:spPr>
       </p:pic>
+      <p:sp>
+        <p:nvSpPr>
+          <p:cNvPr id="3" name="Номер слайда 2"/>
+          <p:cNvSpPr>
+            <a:spLocks noGrp="1"/>
+          </p:cNvSpPr>
+          <p:nvPr>
+            <p:ph type="sldNum" sz="quarter" idx="12"/>
+          </p:nvPr>
+        </p:nvSpPr>
+        <p:spPr/>
+        <p:txBody>
+          <a:bodyPr/>
+          <a:lstStyle/>
+          <a:p>
+            <a:fld id="{1AF1FA71-9C2C-4C19-A9D7-C69366330AE7}" type="slidenum">
+              <a:rPr lang="ru-RU" smtClean="0"/>
+              <a:t>19</a:t>
+            </a:fld>
+            <a:endParaRPr lang="ru-RU"/>
+          </a:p>
+        </p:txBody>
+      </p:sp>
     </p:spTree>
     <p:extLst>
       <p:ext uri="{BB962C8B-B14F-4D97-AF65-F5344CB8AC3E}">
@@ -5266,11 +6012,7 @@
             </a:r>
             <a:r>
               <a:rPr lang="ru-RU" dirty="0" smtClean="0"/>
-              <a:t> – разработка и программная реализация системы сбора и анализа данных социальных </a:t>
-            </a:r>
-            <a:r>
-              <a:rPr lang="ru-RU" dirty="0" smtClean="0"/>
-              <a:t>сетей.</a:t>
+              <a:t> – разработка и программная реализация системы сбора и анализа данных социальных сетей.</a:t>
             </a:r>
             <a:endParaRPr lang="en-US" dirty="0" smtClean="0"/>
           </a:p>
@@ -5287,6 +6029,29 @@
               <a:t> разработки обеспечивается широким распространением социальных сетей в сфере общественной жизни и недостаточным количеством инструментов, выполняющих их комплексный анализ.</a:t>
             </a:r>
             <a:endParaRPr lang="ru-RU" dirty="0"/>
+          </a:p>
+        </p:txBody>
+      </p:sp>
+      <p:sp>
+        <p:nvSpPr>
+          <p:cNvPr id="4" name="Номер слайда 3"/>
+          <p:cNvSpPr>
+            <a:spLocks noGrp="1"/>
+          </p:cNvSpPr>
+          <p:nvPr>
+            <p:ph type="sldNum" sz="quarter" idx="12"/>
+          </p:nvPr>
+        </p:nvSpPr>
+        <p:spPr/>
+        <p:txBody>
+          <a:bodyPr/>
+          <a:lstStyle/>
+          <a:p>
+            <a:fld id="{1AF1FA71-9C2C-4C19-A9D7-C69366330AE7}" type="slidenum">
+              <a:rPr lang="ru-RU" sz="2000" smtClean="0"/>
+              <a:t>2</a:t>
+            </a:fld>
+            <a:endParaRPr lang="ru-RU" sz="2000" dirty="0"/>
           </a:p>
         </p:txBody>
       </p:sp>
@@ -5389,6 +6154,29 @@
           </a:extLst>
         </p:spPr>
       </p:pic>
+      <p:sp>
+        <p:nvSpPr>
+          <p:cNvPr id="3" name="Номер слайда 2"/>
+          <p:cNvSpPr>
+            <a:spLocks noGrp="1"/>
+          </p:cNvSpPr>
+          <p:nvPr>
+            <p:ph type="sldNum" sz="quarter" idx="12"/>
+          </p:nvPr>
+        </p:nvSpPr>
+        <p:spPr/>
+        <p:txBody>
+          <a:bodyPr/>
+          <a:lstStyle/>
+          <a:p>
+            <a:fld id="{1AF1FA71-9C2C-4C19-A9D7-C69366330AE7}" type="slidenum">
+              <a:rPr lang="ru-RU" smtClean="0"/>
+              <a:t>20</a:t>
+            </a:fld>
+            <a:endParaRPr lang="ru-RU"/>
+          </a:p>
+        </p:txBody>
+      </p:sp>
     </p:spTree>
     <p:extLst>
       <p:ext uri="{BB962C8B-B14F-4D97-AF65-F5344CB8AC3E}">
@@ -5474,6 +6262,29 @@
               <a:t>Ускорение работы рекомендательной системы</a:t>
             </a:r>
             <a:endParaRPr lang="ru-RU" dirty="0"/>
+          </a:p>
+        </p:txBody>
+      </p:sp>
+      <p:sp>
+        <p:nvSpPr>
+          <p:cNvPr id="4" name="Номер слайда 3"/>
+          <p:cNvSpPr>
+            <a:spLocks noGrp="1"/>
+          </p:cNvSpPr>
+          <p:nvPr>
+            <p:ph type="sldNum" sz="quarter" idx="12"/>
+          </p:nvPr>
+        </p:nvSpPr>
+        <p:spPr/>
+        <p:txBody>
+          <a:bodyPr/>
+          <a:lstStyle/>
+          <a:p>
+            <a:fld id="{1AF1FA71-9C2C-4C19-A9D7-C69366330AE7}" type="slidenum">
+              <a:rPr lang="ru-RU" smtClean="0"/>
+              <a:t>21</a:t>
+            </a:fld>
+            <a:endParaRPr lang="ru-RU"/>
           </a:p>
         </p:txBody>
       </p:sp>
@@ -5607,6 +6418,29 @@
           </a:p>
         </p:txBody>
       </p:sp>
+      <p:sp>
+        <p:nvSpPr>
+          <p:cNvPr id="4" name="Номер слайда 3"/>
+          <p:cNvSpPr>
+            <a:spLocks noGrp="1"/>
+          </p:cNvSpPr>
+          <p:nvPr>
+            <p:ph type="sldNum" sz="quarter" idx="12"/>
+          </p:nvPr>
+        </p:nvSpPr>
+        <p:spPr/>
+        <p:txBody>
+          <a:bodyPr/>
+          <a:lstStyle/>
+          <a:p>
+            <a:fld id="{1AF1FA71-9C2C-4C19-A9D7-C69366330AE7}" type="slidenum">
+              <a:rPr lang="ru-RU" smtClean="0"/>
+              <a:t>22</a:t>
+            </a:fld>
+            <a:endParaRPr lang="ru-RU"/>
+          </a:p>
+        </p:txBody>
+      </p:sp>
     </p:spTree>
     <p:extLst>
       <p:ext uri="{BB962C8B-B14F-4D97-AF65-F5344CB8AC3E}">
@@ -5734,6 +6568,29 @@
               <a:buNone/>
             </a:pPr>
             <a:endParaRPr lang="ru-RU" dirty="0"/>
+          </a:p>
+        </p:txBody>
+      </p:sp>
+      <p:sp>
+        <p:nvSpPr>
+          <p:cNvPr id="4" name="Номер слайда 3"/>
+          <p:cNvSpPr>
+            <a:spLocks noGrp="1"/>
+          </p:cNvSpPr>
+          <p:nvPr>
+            <p:ph type="sldNum" sz="quarter" idx="12"/>
+          </p:nvPr>
+        </p:nvSpPr>
+        <p:spPr/>
+        <p:txBody>
+          <a:bodyPr/>
+          <a:lstStyle/>
+          <a:p>
+            <a:fld id="{1AF1FA71-9C2C-4C19-A9D7-C69366330AE7}" type="slidenum">
+              <a:rPr lang="ru-RU" smtClean="0"/>
+              <a:t>23</a:t>
+            </a:fld>
+            <a:endParaRPr lang="ru-RU"/>
           </a:p>
         </p:txBody>
       </p:sp>
@@ -6024,6 +6881,29 @@
           </a:extLst>
         </p:spPr>
       </p:pic>
+      <p:sp>
+        <p:nvSpPr>
+          <p:cNvPr id="3" name="Номер слайда 2"/>
+          <p:cNvSpPr>
+            <a:spLocks noGrp="1"/>
+          </p:cNvSpPr>
+          <p:nvPr>
+            <p:ph type="sldNum" sz="quarter" idx="12"/>
+          </p:nvPr>
+        </p:nvSpPr>
+        <p:spPr/>
+        <p:txBody>
+          <a:bodyPr/>
+          <a:lstStyle/>
+          <a:p>
+            <a:fld id="{1AF1FA71-9C2C-4C19-A9D7-C69366330AE7}" type="slidenum">
+              <a:rPr lang="ru-RU" sz="2000" smtClean="0"/>
+              <a:t>3</a:t>
+            </a:fld>
+            <a:endParaRPr lang="ru-RU" sz="2000" dirty="0"/>
+          </a:p>
+        </p:txBody>
+      </p:sp>
     </p:spTree>
     <p:extLst>
       <p:ext uri="{BB962C8B-B14F-4D97-AF65-F5344CB8AC3E}">
@@ -6248,6 +7128,29 @@
           </a:extLst>
         </p:spPr>
       </p:pic>
+      <p:sp>
+        <p:nvSpPr>
+          <p:cNvPr id="3" name="Номер слайда 2"/>
+          <p:cNvSpPr>
+            <a:spLocks noGrp="1"/>
+          </p:cNvSpPr>
+          <p:nvPr>
+            <p:ph type="sldNum" sz="quarter" idx="12"/>
+          </p:nvPr>
+        </p:nvSpPr>
+        <p:spPr/>
+        <p:txBody>
+          <a:bodyPr/>
+          <a:lstStyle/>
+          <a:p>
+            <a:fld id="{1AF1FA71-9C2C-4C19-A9D7-C69366330AE7}" type="slidenum">
+              <a:rPr lang="ru-RU" sz="2000" smtClean="0"/>
+              <a:t>4</a:t>
+            </a:fld>
+            <a:endParaRPr lang="ru-RU" sz="2000" dirty="0"/>
+          </a:p>
+        </p:txBody>
+      </p:sp>
     </p:spTree>
     <p:extLst>
       <p:ext uri="{BB962C8B-B14F-4D97-AF65-F5344CB8AC3E}">
@@ -6392,6 +7295,29 @@
               <a:t>Gazer</a:t>
             </a:r>
             <a:endParaRPr lang="ru-RU" sz="3600" dirty="0"/>
+          </a:p>
+        </p:txBody>
+      </p:sp>
+      <p:sp>
+        <p:nvSpPr>
+          <p:cNvPr id="3" name="Номер слайда 2"/>
+          <p:cNvSpPr>
+            <a:spLocks noGrp="1"/>
+          </p:cNvSpPr>
+          <p:nvPr>
+            <p:ph type="sldNum" sz="quarter" idx="12"/>
+          </p:nvPr>
+        </p:nvSpPr>
+        <p:spPr/>
+        <p:txBody>
+          <a:bodyPr/>
+          <a:lstStyle/>
+          <a:p>
+            <a:fld id="{1AF1FA71-9C2C-4C19-A9D7-C69366330AE7}" type="slidenum">
+              <a:rPr lang="ru-RU" sz="2000" smtClean="0"/>
+              <a:t>5</a:t>
+            </a:fld>
+            <a:endParaRPr lang="ru-RU" sz="2000"/>
           </a:p>
         </p:txBody>
       </p:sp>
@@ -6578,6 +7504,29 @@
               <a:t>GHRecommender</a:t>
             </a:r>
             <a:endParaRPr lang="ru-RU" sz="3200" dirty="0"/>
+          </a:p>
+        </p:txBody>
+      </p:sp>
+      <p:sp>
+        <p:nvSpPr>
+          <p:cNvPr id="3" name="Номер слайда 2"/>
+          <p:cNvSpPr>
+            <a:spLocks noGrp="1"/>
+          </p:cNvSpPr>
+          <p:nvPr>
+            <p:ph type="sldNum" sz="quarter" idx="12"/>
+          </p:nvPr>
+        </p:nvSpPr>
+        <p:spPr/>
+        <p:txBody>
+          <a:bodyPr/>
+          <a:lstStyle/>
+          <a:p>
+            <a:fld id="{1AF1FA71-9C2C-4C19-A9D7-C69366330AE7}" type="slidenum">
+              <a:rPr lang="ru-RU" sz="2000" smtClean="0"/>
+              <a:t>6</a:t>
+            </a:fld>
+            <a:endParaRPr lang="ru-RU" sz="2000" dirty="0"/>
           </a:p>
         </p:txBody>
       </p:sp>
@@ -6805,6 +7754,29 @@
           </a:extLst>
         </p:spPr>
       </p:pic>
+      <p:sp>
+        <p:nvSpPr>
+          <p:cNvPr id="3" name="Номер слайда 2"/>
+          <p:cNvSpPr>
+            <a:spLocks noGrp="1"/>
+          </p:cNvSpPr>
+          <p:nvPr>
+            <p:ph type="sldNum" sz="quarter" idx="12"/>
+          </p:nvPr>
+        </p:nvSpPr>
+        <p:spPr/>
+        <p:txBody>
+          <a:bodyPr/>
+          <a:lstStyle/>
+          <a:p>
+            <a:fld id="{1AF1FA71-9C2C-4C19-A9D7-C69366330AE7}" type="slidenum">
+              <a:rPr lang="ru-RU" smtClean="0"/>
+              <a:t>7</a:t>
+            </a:fld>
+            <a:endParaRPr lang="ru-RU"/>
+          </a:p>
+        </p:txBody>
+      </p:sp>
     </p:spTree>
     <p:extLst>
       <p:ext uri="{BB962C8B-B14F-4D97-AF65-F5344CB8AC3E}">
@@ -6988,6 +7960,29 @@
           </a:extLst>
         </p:spPr>
       </p:pic>
+      <p:sp>
+        <p:nvSpPr>
+          <p:cNvPr id="3" name="Номер слайда 2"/>
+          <p:cNvSpPr>
+            <a:spLocks noGrp="1"/>
+          </p:cNvSpPr>
+          <p:nvPr>
+            <p:ph type="sldNum" sz="quarter" idx="12"/>
+          </p:nvPr>
+        </p:nvSpPr>
+        <p:spPr/>
+        <p:txBody>
+          <a:bodyPr/>
+          <a:lstStyle/>
+          <a:p>
+            <a:fld id="{1AF1FA71-9C2C-4C19-A9D7-C69366330AE7}" type="slidenum">
+              <a:rPr lang="ru-RU" smtClean="0"/>
+              <a:t>8</a:t>
+            </a:fld>
+            <a:endParaRPr lang="ru-RU"/>
+          </a:p>
+        </p:txBody>
+      </p:sp>
     </p:spTree>
     <p:extLst>
       <p:ext uri="{BB962C8B-B14F-4D97-AF65-F5344CB8AC3E}">
@@ -7091,6 +8086,29 @@
           </a:extLst>
         </p:spPr>
       </p:pic>
+      <p:sp>
+        <p:nvSpPr>
+          <p:cNvPr id="3" name="Номер слайда 2"/>
+          <p:cNvSpPr>
+            <a:spLocks noGrp="1"/>
+          </p:cNvSpPr>
+          <p:nvPr>
+            <p:ph type="sldNum" sz="quarter" idx="12"/>
+          </p:nvPr>
+        </p:nvSpPr>
+        <p:spPr/>
+        <p:txBody>
+          <a:bodyPr/>
+          <a:lstStyle/>
+          <a:p>
+            <a:fld id="{1AF1FA71-9C2C-4C19-A9D7-C69366330AE7}" type="slidenum">
+              <a:rPr lang="ru-RU" smtClean="0"/>
+              <a:t>9</a:t>
+            </a:fld>
+            <a:endParaRPr lang="ru-RU"/>
+          </a:p>
+        </p:txBody>
+      </p:sp>
     </p:spTree>
     <p:extLst>
       <p:ext uri="{BB962C8B-B14F-4D97-AF65-F5344CB8AC3E}">
@@ -7394,4 +8412,289 @@
   <a:objectDefaults/>
   <a:extraClrSchemeLst/>
 </a:theme>
+</file>
+
+<file path=ppt/theme/theme2.xml><?xml version="1.0" encoding="utf-8"?>
+<a:theme xmlns:a="http://schemas.openxmlformats.org/drawingml/2006/main" name="Тема Office">
+  <a:themeElements>
+    <a:clrScheme name="Стандартная">
+      <a:dk1>
+        <a:sysClr val="windowText" lastClr="000000"/>
+      </a:dk1>
+      <a:lt1>
+        <a:sysClr val="window" lastClr="FFFFFF"/>
+      </a:lt1>
+      <a:dk2>
+        <a:srgbClr val="1F497D"/>
+      </a:dk2>
+      <a:lt2>
+        <a:srgbClr val="EEECE1"/>
+      </a:lt2>
+      <a:accent1>
+        <a:srgbClr val="4F81BD"/>
+      </a:accent1>
+      <a:accent2>
+        <a:srgbClr val="C0504D"/>
+      </a:accent2>
+      <a:accent3>
+        <a:srgbClr val="9BBB59"/>
+      </a:accent3>
+      <a:accent4>
+        <a:srgbClr val="8064A2"/>
+      </a:accent4>
+      <a:accent5>
+        <a:srgbClr val="4BACC6"/>
+      </a:accent5>
+      <a:accent6>
+        <a:srgbClr val="F79646"/>
+      </a:accent6>
+      <a:hlink>
+        <a:srgbClr val="0000FF"/>
+      </a:hlink>
+      <a:folHlink>
+        <a:srgbClr val="800080"/>
+      </a:folHlink>
+    </a:clrScheme>
+    <a:fontScheme name="Стандартная">
+      <a:majorFont>
+        <a:latin typeface="Calibri"/>
+        <a:ea typeface=""/>
+        <a:cs typeface=""/>
+        <a:font script="Jpan" typeface="ＭＳ Ｐゴシック"/>
+        <a:font script="Hang" typeface="맑은 고딕"/>
+        <a:font script="Hans" typeface="宋体"/>
+        <a:font script="Hant" typeface="新細明體"/>
+        <a:font script="Arab" typeface="Times New Roman"/>
+        <a:font script="Hebr" typeface="Times New Roman"/>
+        <a:font script="Thai" typeface="Angsana New"/>
+        <a:font script="Ethi" typeface="Nyala"/>
+        <a:font script="Beng" typeface="Vrinda"/>
+        <a:font script="Gujr" typeface="Shruti"/>
+        <a:font script="Khmr" typeface="MoolBoran"/>
+        <a:font script="Knda" typeface="Tunga"/>
+        <a:font script="Guru" typeface="Raavi"/>
+        <a:font script="Cans" typeface="Euphemia"/>
+        <a:font script="Cher" typeface="Plantagenet Cherokee"/>
+        <a:font script="Yiii" typeface="Microsoft Yi Baiti"/>
+        <a:font script="Tibt" typeface="Microsoft Himalaya"/>
+        <a:font script="Thaa" typeface="MV Boli"/>
+        <a:font script="Deva" typeface="Mangal"/>
+        <a:font script="Telu" typeface="Gautami"/>
+        <a:font script="Taml" typeface="Latha"/>
+        <a:font script="Syrc" typeface="Estrangelo Edessa"/>
+        <a:font script="Orya" typeface="Kalinga"/>
+        <a:font script="Mlym" typeface="Kartika"/>
+        <a:font script="Laoo" typeface="DokChampa"/>
+        <a:font script="Sinh" typeface="Iskoola Pota"/>
+        <a:font script="Mong" typeface="Mongolian Baiti"/>
+        <a:font script="Viet" typeface="Times New Roman"/>
+        <a:font script="Uigh" typeface="Microsoft Uighur"/>
+        <a:font script="Geor" typeface="Sylfaen"/>
+      </a:majorFont>
+      <a:minorFont>
+        <a:latin typeface="Calibri"/>
+        <a:ea typeface=""/>
+        <a:cs typeface=""/>
+        <a:font script="Jpan" typeface="ＭＳ Ｐゴシック"/>
+        <a:font script="Hang" typeface="맑은 고딕"/>
+        <a:font script="Hans" typeface="宋体"/>
+        <a:font script="Hant" typeface="新細明體"/>
+        <a:font script="Arab" typeface="Arial"/>
+        <a:font script="Hebr" typeface="Arial"/>
+        <a:font script="Thai" typeface="Cordia New"/>
+        <a:font script="Ethi" typeface="Nyala"/>
+        <a:font script="Beng" typeface="Vrinda"/>
+        <a:font script="Gujr" typeface="Shruti"/>
+        <a:font script="Khmr" typeface="DaunPenh"/>
+        <a:font script="Knda" typeface="Tunga"/>
+        <a:font script="Guru" typeface="Raavi"/>
+        <a:font script="Cans" typeface="Euphemia"/>
+        <a:font script="Cher" typeface="Plantagenet Cherokee"/>
+        <a:font script="Yiii" typeface="Microsoft Yi Baiti"/>
+        <a:font script="Tibt" typeface="Microsoft Himalaya"/>
+        <a:font script="Thaa" typeface="MV Boli"/>
+        <a:font script="Deva" typeface="Mangal"/>
+        <a:font script="Telu" typeface="Gautami"/>
+        <a:font script="Taml" typeface="Latha"/>
+        <a:font script="Syrc" typeface="Estrangelo Edessa"/>
+        <a:font script="Orya" typeface="Kalinga"/>
+        <a:font script="Mlym" typeface="Kartika"/>
+        <a:font script="Laoo" typeface="DokChampa"/>
+        <a:font script="Sinh" typeface="Iskoola Pota"/>
+        <a:font script="Mong" typeface="Mongolian Baiti"/>
+        <a:font script="Viet" typeface="Arial"/>
+        <a:font script="Uigh" typeface="Microsoft Uighur"/>
+        <a:font script="Geor" typeface="Sylfaen"/>
+      </a:minorFont>
+    </a:fontScheme>
+    <a:fmtScheme name="Стандартная">
+      <a:fillStyleLst>
+        <a:solidFill>
+          <a:schemeClr val="phClr"/>
+        </a:solidFill>
+        <a:gradFill rotWithShape="1">
+          <a:gsLst>
+            <a:gs pos="0">
+              <a:schemeClr val="phClr">
+                <a:tint val="50000"/>
+                <a:satMod val="300000"/>
+              </a:schemeClr>
+            </a:gs>
+            <a:gs pos="35000">
+              <a:schemeClr val="phClr">
+                <a:tint val="37000"/>
+                <a:satMod val="300000"/>
+              </a:schemeClr>
+            </a:gs>
+            <a:gs pos="100000">
+              <a:schemeClr val="phClr">
+                <a:tint val="15000"/>
+                <a:satMod val="350000"/>
+              </a:schemeClr>
+            </a:gs>
+          </a:gsLst>
+          <a:lin ang="16200000" scaled="1"/>
+        </a:gradFill>
+        <a:gradFill rotWithShape="1">
+          <a:gsLst>
+            <a:gs pos="0">
+              <a:schemeClr val="phClr">
+                <a:shade val="51000"/>
+                <a:satMod val="130000"/>
+              </a:schemeClr>
+            </a:gs>
+            <a:gs pos="80000">
+              <a:schemeClr val="phClr">
+                <a:shade val="93000"/>
+                <a:satMod val="130000"/>
+              </a:schemeClr>
+            </a:gs>
+            <a:gs pos="100000">
+              <a:schemeClr val="phClr">
+                <a:shade val="94000"/>
+                <a:satMod val="135000"/>
+              </a:schemeClr>
+            </a:gs>
+          </a:gsLst>
+          <a:lin ang="16200000" scaled="0"/>
+        </a:gradFill>
+      </a:fillStyleLst>
+      <a:lnStyleLst>
+        <a:ln w="9525" cap="flat" cmpd="sng" algn="ctr">
+          <a:solidFill>
+            <a:schemeClr val="phClr">
+              <a:shade val="95000"/>
+              <a:satMod val="105000"/>
+            </a:schemeClr>
+          </a:solidFill>
+          <a:prstDash val="solid"/>
+        </a:ln>
+        <a:ln w="25400" cap="flat" cmpd="sng" algn="ctr">
+          <a:solidFill>
+            <a:schemeClr val="phClr"/>
+          </a:solidFill>
+          <a:prstDash val="solid"/>
+        </a:ln>
+        <a:ln w="38100" cap="flat" cmpd="sng" algn="ctr">
+          <a:solidFill>
+            <a:schemeClr val="phClr"/>
+          </a:solidFill>
+          <a:prstDash val="solid"/>
+        </a:ln>
+      </a:lnStyleLst>
+      <a:effectStyleLst>
+        <a:effectStyle>
+          <a:effectLst>
+            <a:outerShdw blurRad="40000" dist="20000" dir="5400000" rotWithShape="0">
+              <a:srgbClr val="000000">
+                <a:alpha val="38000"/>
+              </a:srgbClr>
+            </a:outerShdw>
+          </a:effectLst>
+        </a:effectStyle>
+        <a:effectStyle>
+          <a:effectLst>
+            <a:outerShdw blurRad="40000" dist="23000" dir="5400000" rotWithShape="0">
+              <a:srgbClr val="000000">
+                <a:alpha val="35000"/>
+              </a:srgbClr>
+            </a:outerShdw>
+          </a:effectLst>
+        </a:effectStyle>
+        <a:effectStyle>
+          <a:effectLst>
+            <a:outerShdw blurRad="40000" dist="23000" dir="5400000" rotWithShape="0">
+              <a:srgbClr val="000000">
+                <a:alpha val="35000"/>
+              </a:srgbClr>
+            </a:outerShdw>
+          </a:effectLst>
+          <a:scene3d>
+            <a:camera prst="orthographicFront">
+              <a:rot lat="0" lon="0" rev="0"/>
+            </a:camera>
+            <a:lightRig rig="threePt" dir="t">
+              <a:rot lat="0" lon="0" rev="1200000"/>
+            </a:lightRig>
+          </a:scene3d>
+          <a:sp3d>
+            <a:bevelT w="63500" h="25400"/>
+          </a:sp3d>
+        </a:effectStyle>
+      </a:effectStyleLst>
+      <a:bgFillStyleLst>
+        <a:solidFill>
+          <a:schemeClr val="phClr"/>
+        </a:solidFill>
+        <a:gradFill rotWithShape="1">
+          <a:gsLst>
+            <a:gs pos="0">
+              <a:schemeClr val="phClr">
+                <a:tint val="40000"/>
+                <a:satMod val="350000"/>
+              </a:schemeClr>
+            </a:gs>
+            <a:gs pos="40000">
+              <a:schemeClr val="phClr">
+                <a:tint val="45000"/>
+                <a:shade val="99000"/>
+                <a:satMod val="350000"/>
+              </a:schemeClr>
+            </a:gs>
+            <a:gs pos="100000">
+              <a:schemeClr val="phClr">
+                <a:shade val="20000"/>
+                <a:satMod val="255000"/>
+              </a:schemeClr>
+            </a:gs>
+          </a:gsLst>
+          <a:path path="circle">
+            <a:fillToRect l="50000" t="-80000" r="50000" b="180000"/>
+          </a:path>
+        </a:gradFill>
+        <a:gradFill rotWithShape="1">
+          <a:gsLst>
+            <a:gs pos="0">
+              <a:schemeClr val="phClr">
+                <a:tint val="80000"/>
+                <a:satMod val="300000"/>
+              </a:schemeClr>
+            </a:gs>
+            <a:gs pos="100000">
+              <a:schemeClr val="phClr">
+                <a:shade val="30000"/>
+                <a:satMod val="200000"/>
+              </a:schemeClr>
+            </a:gs>
+          </a:gsLst>
+          <a:path path="circle">
+            <a:fillToRect l="50000" t="50000" r="50000" b="50000"/>
+          </a:path>
+        </a:gradFill>
+      </a:bgFillStyleLst>
+    </a:fmtScheme>
+  </a:themeElements>
+  <a:objectDefaults/>
+  <a:extraClrSchemeLst/>
+</a:theme>
 </file>
</xml_diff>